<commit_message>
Added more to presentation
</commit_message>
<xml_diff>
--- a/Gesture Based UI Project.pptx
+++ b/Gesture Based UI Project.pptx
@@ -12,6 +12,7 @@
     <p:sldId id="262" r:id="rId6"/>
     <p:sldId id="260" r:id="rId7"/>
     <p:sldId id="263" r:id="rId8"/>
+    <p:sldId id="264" r:id="rId9"/>
   </p:sldIdLst>
   <p:sldSz cx="12192000" cy="6858000"/>
   <p:notesSz cx="6858000" cy="9144000"/>
@@ -110,6 +111,11 @@
       </a:defRPr>
     </a:lvl9pPr>
   </p:defaultTextStyle>
+  <p:extLst>
+    <p:ext uri="{EFAFB233-063F-42B5-8137-9DF3F51BA10A}">
+      <p15:sldGuideLst xmlns:p15="http://schemas.microsoft.com/office/powerpoint/2012/main"/>
+    </p:ext>
+  </p:extLst>
 </p:presentation>
 </file>
 
@@ -6958,6 +6964,135 @@
 </p:sld>
 </file>
 
+<file path=ppt/slides/slide8.xml><?xml version="1.0" encoding="utf-8"?>
+<p:sld xmlns:a="http://schemas.openxmlformats.org/drawingml/2006/main" xmlns:r="http://schemas.openxmlformats.org/officeDocument/2006/relationships" xmlns:p="http://schemas.openxmlformats.org/presentationml/2006/main">
+  <p:cSld>
+    <p:spTree>
+      <p:nvGrpSpPr>
+        <p:cNvPr id="1" name=""/>
+        <p:cNvGrpSpPr/>
+        <p:nvPr/>
+      </p:nvGrpSpPr>
+      <p:grpSpPr>
+        <a:xfrm>
+          <a:off x="0" y="0"/>
+          <a:ext cx="0" cy="0"/>
+          <a:chOff x="0" y="0"/>
+          <a:chExt cx="0" cy="0"/>
+        </a:xfrm>
+      </p:grpSpPr>
+      <p:sp>
+        <p:nvSpPr>
+          <p:cNvPr id="2" name="Title 1">
+            <a:extLst>
+              <a:ext uri="{FF2B5EF4-FFF2-40B4-BE49-F238E27FC236}">
+                <a16:creationId xmlns:a16="http://schemas.microsoft.com/office/drawing/2014/main" id="{5845DEFE-B671-451D-9DFE-9A9E6C3E872F}"/>
+              </a:ext>
+            </a:extLst>
+          </p:cNvPr>
+          <p:cNvSpPr>
+            <a:spLocks noGrp="1"/>
+          </p:cNvSpPr>
+          <p:nvPr>
+            <p:ph type="title"/>
+          </p:nvPr>
+        </p:nvSpPr>
+        <p:spPr/>
+        <p:txBody>
+          <a:bodyPr/>
+          <a:lstStyle/>
+          <a:p>
+            <a:r>
+              <a:rPr lang="en-IE" dirty="0"/>
+              <a:t>Code Example</a:t>
+            </a:r>
+          </a:p>
+        </p:txBody>
+      </p:sp>
+      <p:pic>
+        <p:nvPicPr>
+          <p:cNvPr id="10" name="Content Placeholder 9">
+            <a:extLst>
+              <a:ext uri="{FF2B5EF4-FFF2-40B4-BE49-F238E27FC236}">
+                <a16:creationId xmlns:a16="http://schemas.microsoft.com/office/drawing/2014/main" id="{CF35CE84-C011-4B80-931F-80419821778E}"/>
+              </a:ext>
+            </a:extLst>
+          </p:cNvPr>
+          <p:cNvPicPr>
+            <a:picLocks noGrp="1" noChangeAspect="1"/>
+          </p:cNvPicPr>
+          <p:nvPr>
+            <p:ph idx="1"/>
+          </p:nvPr>
+        </p:nvPicPr>
+        <p:blipFill>
+          <a:blip r:embed="rId2">
+            <a:extLst>
+              <a:ext uri="{28A0092B-C50C-407E-A947-70E740481C1C}">
+                <a14:useLocalDpi xmlns:a14="http://schemas.microsoft.com/office/drawing/2010/main" val="0"/>
+              </a:ext>
+            </a:extLst>
+          </a:blip>
+          <a:stretch>
+            <a:fillRect/>
+          </a:stretch>
+        </p:blipFill>
+        <p:spPr>
+          <a:xfrm>
+            <a:off x="1484311" y="2438399"/>
+            <a:ext cx="2962688" cy="1857634"/>
+          </a:xfrm>
+        </p:spPr>
+      </p:pic>
+      <p:pic>
+        <p:nvPicPr>
+          <p:cNvPr id="12" name="Picture 11">
+            <a:extLst>
+              <a:ext uri="{FF2B5EF4-FFF2-40B4-BE49-F238E27FC236}">
+                <a16:creationId xmlns:a16="http://schemas.microsoft.com/office/drawing/2014/main" id="{FE94B303-FC10-4458-86AF-43DB2AC77261}"/>
+              </a:ext>
+            </a:extLst>
+          </p:cNvPr>
+          <p:cNvPicPr>
+            <a:picLocks noChangeAspect="1"/>
+          </p:cNvPicPr>
+          <p:nvPr/>
+        </p:nvPicPr>
+        <p:blipFill>
+          <a:blip r:embed="rId3">
+            <a:extLst>
+              <a:ext uri="{28A0092B-C50C-407E-A947-70E740481C1C}">
+                <a14:useLocalDpi xmlns:a14="http://schemas.microsoft.com/office/drawing/2010/main" val="0"/>
+              </a:ext>
+            </a:extLst>
+          </a:blip>
+          <a:stretch>
+            <a:fillRect/>
+          </a:stretch>
+        </p:blipFill>
+        <p:spPr>
+          <a:xfrm>
+            <a:off x="4853864" y="2438399"/>
+            <a:ext cx="6925642" cy="1924319"/>
+          </a:xfrm>
+          <a:prstGeom prst="rect">
+            <a:avLst/>
+          </a:prstGeom>
+        </p:spPr>
+      </p:pic>
+    </p:spTree>
+    <p:extLst>
+      <p:ext uri="{BB962C8B-B14F-4D97-AF65-F5344CB8AC3E}">
+        <p14:creationId xmlns:p14="http://schemas.microsoft.com/office/powerpoint/2010/main" val="3118762054"/>
+      </p:ext>
+    </p:extLst>
+  </p:cSld>
+  <p:clrMapOvr>
+    <a:masterClrMapping/>
+  </p:clrMapOvr>
+</p:sld>
+</file>
+
 <file path=ppt/theme/theme1.xml><?xml version="1.0" encoding="utf-8"?>
 <a:theme xmlns:a="http://schemas.openxmlformats.org/drawingml/2006/main" name="Parallax">
   <a:themeElements>

</xml_diff>

<commit_message>
Redesigned options scene, added pause menu to main scene, and updated presentation
</commit_message>
<xml_diff>
--- a/Gesture Based UI Project.pptx
+++ b/Gesture Based UI Project.pptx
@@ -7,14 +7,10 @@
   <p:sldIdLst>
     <p:sldId id="256" r:id="rId2"/>
     <p:sldId id="257" r:id="rId3"/>
-    <p:sldId id="265" r:id="rId4"/>
-    <p:sldId id="266" r:id="rId5"/>
-    <p:sldId id="264" r:id="rId6"/>
-    <p:sldId id="263" r:id="rId7"/>
-    <p:sldId id="258" r:id="rId8"/>
-    <p:sldId id="259" r:id="rId9"/>
-    <p:sldId id="262" r:id="rId10"/>
-    <p:sldId id="260" r:id="rId11"/>
+    <p:sldId id="266" r:id="rId4"/>
+    <p:sldId id="267" r:id="rId5"/>
+    <p:sldId id="268" r:id="rId6"/>
+    <p:sldId id="269" r:id="rId7"/>
   </p:sldIdLst>
   <p:sldSz cx="12192000" cy="6858000"/>
   <p:notesSz cx="6858000" cy="9144000"/>
@@ -623,7 +619,7 @@
           <a:p>
             <a:fld id="{6332FE72-1E95-463A-95D4-9DD1E29E749E}" type="datetimeFigureOut">
               <a:rPr lang="en-IE" smtClean="0"/>
-              <a:t>02/04/2019</a:t>
+              <a:t>04/04/2019</a:t>
             </a:fld>
             <a:endParaRPr lang="en-IE"/>
           </a:p>
@@ -919,7 +915,7 @@
           <a:p>
             <a:fld id="{6332FE72-1E95-463A-95D4-9DD1E29E749E}" type="datetimeFigureOut">
               <a:rPr lang="en-IE" smtClean="0"/>
-              <a:t>02/04/2019</a:t>
+              <a:t>04/04/2019</a:t>
             </a:fld>
             <a:endParaRPr lang="en-IE"/>
           </a:p>
@@ -1167,7 +1163,7 @@
           <a:p>
             <a:fld id="{6332FE72-1E95-463A-95D4-9DD1E29E749E}" type="datetimeFigureOut">
               <a:rPr lang="en-IE" smtClean="0"/>
-              <a:t>02/04/2019</a:t>
+              <a:t>04/04/2019</a:t>
             </a:fld>
             <a:endParaRPr lang="en-IE"/>
           </a:p>
@@ -1707,7 +1703,7 @@
           <a:p>
             <a:fld id="{6332FE72-1E95-463A-95D4-9DD1E29E749E}" type="datetimeFigureOut">
               <a:rPr lang="en-IE" smtClean="0"/>
-              <a:t>02/04/2019</a:t>
+              <a:t>04/04/2019</a:t>
             </a:fld>
             <a:endParaRPr lang="en-IE"/>
           </a:p>
@@ -1955,7 +1951,7 @@
           <a:p>
             <a:fld id="{6332FE72-1E95-463A-95D4-9DD1E29E749E}" type="datetimeFigureOut">
               <a:rPr lang="en-IE" smtClean="0"/>
-              <a:t>02/04/2019</a:t>
+              <a:t>04/04/2019</a:t>
             </a:fld>
             <a:endParaRPr lang="en-IE"/>
           </a:p>
@@ -2487,7 +2483,7 @@
           <a:p>
             <a:fld id="{6332FE72-1E95-463A-95D4-9DD1E29E749E}" type="datetimeFigureOut">
               <a:rPr lang="en-IE" smtClean="0"/>
-              <a:t>02/04/2019</a:t>
+              <a:t>04/04/2019</a:t>
             </a:fld>
             <a:endParaRPr lang="en-IE"/>
           </a:p>
@@ -2784,7 +2780,7 @@
           <a:p>
             <a:fld id="{6332FE72-1E95-463A-95D4-9DD1E29E749E}" type="datetimeFigureOut">
               <a:rPr lang="en-IE" smtClean="0"/>
-              <a:t>02/04/2019</a:t>
+              <a:t>04/04/2019</a:t>
             </a:fld>
             <a:endParaRPr lang="en-IE"/>
           </a:p>
@@ -2958,7 +2954,7 @@
           <a:p>
             <a:fld id="{6332FE72-1E95-463A-95D4-9DD1E29E749E}" type="datetimeFigureOut">
               <a:rPr lang="en-IE" smtClean="0"/>
-              <a:t>02/04/2019</a:t>
+              <a:t>04/04/2019</a:t>
             </a:fld>
             <a:endParaRPr lang="en-IE"/>
           </a:p>
@@ -3138,7 +3134,7 @@
           <a:p>
             <a:fld id="{6332FE72-1E95-463A-95D4-9DD1E29E749E}" type="datetimeFigureOut">
               <a:rPr lang="en-IE" smtClean="0"/>
-              <a:t>02/04/2019</a:t>
+              <a:t>04/04/2019</a:t>
             </a:fld>
             <a:endParaRPr lang="en-IE"/>
           </a:p>
@@ -3308,7 +3304,7 @@
           <a:p>
             <a:fld id="{6332FE72-1E95-463A-95D4-9DD1E29E749E}" type="datetimeFigureOut">
               <a:rPr lang="en-IE" smtClean="0"/>
-              <a:t>02/04/2019</a:t>
+              <a:t>04/04/2019</a:t>
             </a:fld>
             <a:endParaRPr lang="en-IE"/>
           </a:p>
@@ -3559,7 +3555,7 @@
           <a:p>
             <a:fld id="{6332FE72-1E95-463A-95D4-9DD1E29E749E}" type="datetimeFigureOut">
               <a:rPr lang="en-IE" smtClean="0"/>
-              <a:t>02/04/2019</a:t>
+              <a:t>04/04/2019</a:t>
             </a:fld>
             <a:endParaRPr lang="en-IE"/>
           </a:p>
@@ -3856,7 +3852,7 @@
           <a:p>
             <a:fld id="{6332FE72-1E95-463A-95D4-9DD1E29E749E}" type="datetimeFigureOut">
               <a:rPr lang="en-IE" smtClean="0"/>
-              <a:t>02/04/2019</a:t>
+              <a:t>04/04/2019</a:t>
             </a:fld>
             <a:endParaRPr lang="en-IE"/>
           </a:p>
@@ -4298,7 +4294,7 @@
           <a:p>
             <a:fld id="{6332FE72-1E95-463A-95D4-9DD1E29E749E}" type="datetimeFigureOut">
               <a:rPr lang="en-IE" smtClean="0"/>
-              <a:t>02/04/2019</a:t>
+              <a:t>04/04/2019</a:t>
             </a:fld>
             <a:endParaRPr lang="en-IE"/>
           </a:p>
@@ -4416,7 +4412,7 @@
           <a:p>
             <a:fld id="{6332FE72-1E95-463A-95D4-9DD1E29E749E}" type="datetimeFigureOut">
               <a:rPr lang="en-IE" smtClean="0"/>
-              <a:t>02/04/2019</a:t>
+              <a:t>04/04/2019</a:t>
             </a:fld>
             <a:endParaRPr lang="en-IE"/>
           </a:p>
@@ -4511,7 +4507,7 @@
           <a:p>
             <a:fld id="{6332FE72-1E95-463A-95D4-9DD1E29E749E}" type="datetimeFigureOut">
               <a:rPr lang="en-IE" smtClean="0"/>
-              <a:t>02/04/2019</a:t>
+              <a:t>04/04/2019</a:t>
             </a:fld>
             <a:endParaRPr lang="en-IE"/>
           </a:p>
@@ -4794,7 +4790,7 @@
           <a:p>
             <a:fld id="{6332FE72-1E95-463A-95D4-9DD1E29E749E}" type="datetimeFigureOut">
               <a:rPr lang="en-IE" smtClean="0"/>
-              <a:t>02/04/2019</a:t>
+              <a:t>04/04/2019</a:t>
             </a:fld>
             <a:endParaRPr lang="en-IE"/>
           </a:p>
@@ -5085,7 +5081,7 @@
           <a:p>
             <a:fld id="{6332FE72-1E95-463A-95D4-9DD1E29E749E}" type="datetimeFigureOut">
               <a:rPr lang="en-IE" smtClean="0"/>
-              <a:t>02/04/2019</a:t>
+              <a:t>04/04/2019</a:t>
             </a:fld>
             <a:endParaRPr lang="en-IE"/>
           </a:p>
@@ -5615,7 +5611,7 @@
           <a:p>
             <a:fld id="{6332FE72-1E95-463A-95D4-9DD1E29E749E}" type="datetimeFigureOut">
               <a:rPr lang="en-IE" smtClean="0"/>
-              <a:t>02/04/2019</a:t>
+              <a:t>04/04/2019</a:t>
             </a:fld>
             <a:endParaRPr lang="en-IE"/>
           </a:p>
@@ -6215,118 +6211,6 @@
 </p:sld>
 </file>
 
-<file path=ppt/slides/slide10.xml><?xml version="1.0" encoding="utf-8"?>
-<p:sld xmlns:a="http://schemas.openxmlformats.org/drawingml/2006/main" xmlns:r="http://schemas.openxmlformats.org/officeDocument/2006/relationships" xmlns:p="http://schemas.openxmlformats.org/presentationml/2006/main">
-  <p:cSld>
-    <p:spTree>
-      <p:nvGrpSpPr>
-        <p:cNvPr id="1" name=""/>
-        <p:cNvGrpSpPr/>
-        <p:nvPr/>
-      </p:nvGrpSpPr>
-      <p:grpSpPr>
-        <a:xfrm>
-          <a:off x="0" y="0"/>
-          <a:ext cx="0" cy="0"/>
-          <a:chOff x="0" y="0"/>
-          <a:chExt cx="0" cy="0"/>
-        </a:xfrm>
-      </p:grpSpPr>
-      <p:sp>
-        <p:nvSpPr>
-          <p:cNvPr id="2" name="Title 1">
-            <a:extLst>
-              <a:ext uri="{FF2B5EF4-FFF2-40B4-BE49-F238E27FC236}">
-                <a16:creationId xmlns:a16="http://schemas.microsoft.com/office/drawing/2014/main" id="{F5755E4E-E432-4966-8C03-7080CEAF2692}"/>
-              </a:ext>
-            </a:extLst>
-          </p:cNvPr>
-          <p:cNvSpPr>
-            <a:spLocks noGrp="1"/>
-          </p:cNvSpPr>
-          <p:nvPr>
-            <p:ph type="title"/>
-          </p:nvPr>
-        </p:nvSpPr>
-        <p:spPr/>
-        <p:txBody>
-          <a:bodyPr/>
-          <a:lstStyle/>
-          <a:p>
-            <a:r>
-              <a:rPr lang="en-IE" dirty="0"/>
-              <a:t>More Gestures</a:t>
-            </a:r>
-          </a:p>
-        </p:txBody>
-      </p:sp>
-      <p:sp>
-        <p:nvSpPr>
-          <p:cNvPr id="3" name="Content Placeholder 2">
-            <a:extLst>
-              <a:ext uri="{FF2B5EF4-FFF2-40B4-BE49-F238E27FC236}">
-                <a16:creationId xmlns:a16="http://schemas.microsoft.com/office/drawing/2014/main" id="{D7FCFF70-52D1-48BE-87EA-F30EDAB659BF}"/>
-              </a:ext>
-            </a:extLst>
-          </p:cNvPr>
-          <p:cNvSpPr>
-            <a:spLocks noGrp="1"/>
-          </p:cNvSpPr>
-          <p:nvPr>
-            <p:ph idx="1"/>
-          </p:nvPr>
-        </p:nvSpPr>
-        <p:spPr>
-          <a:xfrm>
-            <a:off x="1191751" y="2520303"/>
-            <a:ext cx="10018713" cy="3124201"/>
-          </a:xfrm>
-        </p:spPr>
-        <p:txBody>
-          <a:bodyPr/>
-          <a:lstStyle/>
-          <a:p>
-            <a:r>
-              <a:rPr lang="en-IE" dirty="0"/>
-              <a:t>Plan to use more gestures - Main Menu, Pause Menu.</a:t>
-            </a:r>
-          </a:p>
-          <a:p>
-            <a:r>
-              <a:rPr lang="en-IE" dirty="0"/>
-              <a:t>Gestures undecided as of yet.</a:t>
-            </a:r>
-          </a:p>
-          <a:p>
-            <a:r>
-              <a:rPr lang="en-IE" dirty="0"/>
-              <a:t>Each option on screen can be pressed using a different gesture</a:t>
-            </a:r>
-          </a:p>
-          <a:p>
-            <a:pPr marL="457200" lvl="1" indent="0">
-              <a:buNone/>
-            </a:pPr>
-            <a:r>
-              <a:rPr lang="en-IE" dirty="0"/>
-              <a:t>E.g. Wave Out -&gt; Start Game, Wave In -&gt; Options</a:t>
-            </a:r>
-          </a:p>
-        </p:txBody>
-      </p:sp>
-    </p:spTree>
-    <p:extLst>
-      <p:ext uri="{BB962C8B-B14F-4D97-AF65-F5344CB8AC3E}">
-        <p14:creationId xmlns:p14="http://schemas.microsoft.com/office/powerpoint/2010/main" val="2353519469"/>
-      </p:ext>
-    </p:extLst>
-  </p:cSld>
-  <p:clrMapOvr>
-    <a:masterClrMapping/>
-  </p:clrMapOvr>
-</p:sld>
-</file>
-
 <file path=ppt/slides/slide2.xml><?xml version="1.0" encoding="utf-8"?>
 <p:sld xmlns:a="http://schemas.openxmlformats.org/drawingml/2006/main" xmlns:r="http://schemas.openxmlformats.org/officeDocument/2006/relationships" xmlns:p="http://schemas.openxmlformats.org/presentationml/2006/main">
   <p:cSld>
@@ -6346,6 +6230,84 @@
       </p:grpSpPr>
       <p:sp>
         <p:nvSpPr>
+          <p:cNvPr id="2" name="Title 1">
+            <a:extLst>
+              <a:ext uri="{FF2B5EF4-FFF2-40B4-BE49-F238E27FC236}">
+                <a16:creationId xmlns:a16="http://schemas.microsoft.com/office/drawing/2014/main" id="{62C93E9C-48DD-4E92-B663-697EF84303B6}"/>
+              </a:ext>
+            </a:extLst>
+          </p:cNvPr>
+          <p:cNvSpPr>
+            <a:spLocks noGrp="1"/>
+          </p:cNvSpPr>
+          <p:nvPr>
+            <p:ph type="title"/>
+          </p:nvPr>
+        </p:nvSpPr>
+        <p:spPr>
+          <a:xfrm>
+            <a:off x="1484311" y="685800"/>
+            <a:ext cx="10018713" cy="2182091"/>
+          </a:xfrm>
+        </p:spPr>
+        <p:txBody>
+          <a:bodyPr>
+            <a:normAutofit/>
+          </a:bodyPr>
+          <a:lstStyle/>
+          <a:p>
+            <a:r>
+              <a:rPr lang="en-IE" sz="6000" dirty="0" err="1">
+                <a:latin typeface="Chinese Rocks Rg" panose="00000400000000000000" pitchFamily="2" charset="0"/>
+              </a:rPr>
+              <a:t>Rootin</a:t>
+            </a:r>
+            <a:r>
+              <a:rPr lang="en-IE" sz="6000" dirty="0">
+                <a:latin typeface="Chinese Rocks Rg" panose="00000400000000000000" pitchFamily="2" charset="0"/>
+              </a:rPr>
+              <a:t>’ </a:t>
+            </a:r>
+            <a:r>
+              <a:rPr lang="en-IE" sz="6000" dirty="0" err="1">
+                <a:latin typeface="Chinese Rocks Rg" panose="00000400000000000000" pitchFamily="2" charset="0"/>
+              </a:rPr>
+              <a:t>Tootin</a:t>
+            </a:r>
+            <a:r>
+              <a:rPr lang="en-IE" sz="6000" dirty="0">
+                <a:latin typeface="Chinese Rocks Rg" panose="00000400000000000000" pitchFamily="2" charset="0"/>
+              </a:rPr>
+              <a:t>’</a:t>
+            </a:r>
+            <a:br>
+              <a:rPr lang="en-IE" sz="6000" dirty="0">
+                <a:latin typeface="Chinese Rocks Rg" panose="00000400000000000000" pitchFamily="2" charset="0"/>
+              </a:rPr>
+            </a:br>
+            <a:r>
+              <a:rPr lang="en-IE" sz="6000" dirty="0">
+                <a:latin typeface="Chinese Rocks Rg" panose="00000400000000000000" pitchFamily="2" charset="0"/>
+              </a:rPr>
+              <a:t>Cowboy </a:t>
+            </a:r>
+            <a:r>
+              <a:rPr lang="en-IE" sz="6000" dirty="0" err="1">
+                <a:latin typeface="Chinese Rocks Rg" panose="00000400000000000000" pitchFamily="2" charset="0"/>
+              </a:rPr>
+              <a:t>Shootin</a:t>
+            </a:r>
+            <a:r>
+              <a:rPr lang="en-IE" sz="6000" dirty="0">
+                <a:latin typeface="Chinese Rocks Rg" panose="00000400000000000000" pitchFamily="2" charset="0"/>
+              </a:rPr>
+              <a:t>’</a:t>
+            </a:r>
+          </a:p>
+        </p:txBody>
+      </p:sp>
+      <p:sp>
+        <p:nvSpPr>
           <p:cNvPr id="3" name="Content Placeholder 2">
             <a:extLst>
               <a:ext uri="{FF2B5EF4-FFF2-40B4-BE49-F238E27FC236}">
@@ -6360,81 +6322,30 @@
             <p:ph idx="1"/>
           </p:nvPr>
         </p:nvSpPr>
-        <p:spPr>
-          <a:xfrm>
-            <a:off x="1291362" y="2390665"/>
-            <a:ext cx="10018713" cy="3124201"/>
-          </a:xfrm>
-        </p:spPr>
+        <p:spPr/>
         <p:txBody>
           <a:bodyPr/>
           <a:lstStyle/>
           <a:p>
             <a:r>
               <a:rPr lang="en-IE" dirty="0"/>
-              <a:t>First Person Shooter. </a:t>
+              <a:t>First Person Shooter </a:t>
             </a:r>
           </a:p>
           <a:p>
             <a:r>
               <a:rPr lang="en-IE" dirty="0"/>
-              <a:t>Shooting gallery where the user shoots objects in the scene.</a:t>
+              <a:t>Shooting gallery style gameplay</a:t>
             </a:r>
           </a:p>
           <a:p>
             <a:r>
               <a:rPr lang="en-IE" dirty="0"/>
-              <a:t>When the user shoots all the object they advance to the next level</a:t>
-            </a:r>
-          </a:p>
-        </p:txBody>
-      </p:sp>
-      <p:pic>
-        <p:nvPicPr>
-          <p:cNvPr id="5" name="Picture 4">
-            <a:extLst>
-              <a:ext uri="{FF2B5EF4-FFF2-40B4-BE49-F238E27FC236}">
-                <a16:creationId xmlns:a16="http://schemas.microsoft.com/office/drawing/2014/main" id="{A85D8E55-6523-4884-B6F6-EBC3298910F5}"/>
-              </a:ext>
-            </a:extLst>
-          </p:cNvPr>
-          <p:cNvPicPr>
-            <a:picLocks noChangeAspect="1"/>
-          </p:cNvPicPr>
-          <p:nvPr/>
-        </p:nvPicPr>
-        <p:blipFill>
-          <a:blip r:embed="rId2">
-            <a:clrChange>
-              <a:clrFrom>
-                <a:srgbClr val="FFFFFF"/>
-              </a:clrFrom>
-              <a:clrTo>
-                <a:srgbClr val="FFFFFF">
-                  <a:alpha val="0"/>
-                </a:srgbClr>
-              </a:clrTo>
-            </a:clrChange>
-            <a:extLst>
-              <a:ext uri="{28A0092B-C50C-407E-A947-70E740481C1C}">
-                <a14:useLocalDpi xmlns:a14="http://schemas.microsoft.com/office/drawing/2010/main" val="0"/>
-              </a:ext>
-            </a:extLst>
-          </a:blip>
-          <a:stretch>
-            <a:fillRect/>
-          </a:stretch>
-        </p:blipFill>
-        <p:spPr>
-          <a:xfrm>
-            <a:off x="3643576" y="600194"/>
-            <a:ext cx="5314286" cy="1923810"/>
-          </a:xfrm>
-          <a:prstGeom prst="rect">
-            <a:avLst/>
-          </a:prstGeom>
-        </p:spPr>
-      </p:pic>
+              <a:t>Find and shoot all the targets</a:t>
+            </a:r>
+          </a:p>
+        </p:txBody>
+      </p:sp>
     </p:spTree>
     <p:extLst>
       <p:ext uri="{BB962C8B-B14F-4D97-AF65-F5344CB8AC3E}">
@@ -6470,7 +6381,7 @@
           <p:cNvPr id="2" name="Title 1">
             <a:extLst>
               <a:ext uri="{FF2B5EF4-FFF2-40B4-BE49-F238E27FC236}">
-                <a16:creationId xmlns:a16="http://schemas.microsoft.com/office/drawing/2014/main" id="{E6C40C9F-5FCF-4F8C-B2EF-A712A0DA42BF}"/>
+                <a16:creationId xmlns:a16="http://schemas.microsoft.com/office/drawing/2014/main" id="{2F91B12C-ABDD-4383-BA60-7C2FFFF522EE}"/>
               </a:ext>
             </a:extLst>
           </p:cNvPr>
@@ -6481,21 +6392,14 @@
             <p:ph type="title"/>
           </p:nvPr>
         </p:nvSpPr>
-        <p:spPr>
-          <a:xfrm>
-            <a:off x="1484311" y="685800"/>
-            <a:ext cx="9231143" cy="1752599"/>
-          </a:xfrm>
-        </p:spPr>
-        <p:txBody>
-          <a:bodyPr>
-            <a:normAutofit/>
-          </a:bodyPr>
+        <p:spPr/>
+        <p:txBody>
+          <a:bodyPr/>
           <a:lstStyle/>
           <a:p>
             <a:r>
               <a:rPr lang="en-IE" dirty="0"/>
-              <a:t>Initial Ideas</a:t>
+              <a:t>Main Mechanics</a:t>
             </a:r>
           </a:p>
         </p:txBody>
@@ -6505,7 +6409,7 @@
           <p:cNvPr id="3" name="Content Placeholder 2">
             <a:extLst>
               <a:ext uri="{FF2B5EF4-FFF2-40B4-BE49-F238E27FC236}">
-                <a16:creationId xmlns:a16="http://schemas.microsoft.com/office/drawing/2014/main" id="{97D08E46-DD20-44BA-A495-0821C19907FE}"/>
+                <a16:creationId xmlns:a16="http://schemas.microsoft.com/office/drawing/2014/main" id="{2EA01963-FAC3-4CE8-8A12-036CCF76C05D}"/>
               </a:ext>
             </a:extLst>
           </p:cNvPr>
@@ -6516,422 +6420,45 @@
             <p:ph idx="1"/>
           </p:nvPr>
         </p:nvSpPr>
-        <p:spPr>
-          <a:xfrm>
-            <a:off x="2007215" y="2179684"/>
-            <a:ext cx="2677031" cy="3000089"/>
-          </a:xfrm>
-        </p:spPr>
+        <p:spPr/>
         <p:txBody>
           <a:bodyPr/>
           <a:lstStyle/>
           <a:p>
             <a:r>
               <a:rPr lang="en-IE" dirty="0"/>
-              <a:t>Monkey Ball style ball roller</a:t>
-            </a:r>
-          </a:p>
-          <a:p>
+              <a:t>Armbands motion controls camera movement</a:t>
+            </a:r>
+          </a:p>
+          <a:p>
+            <a:r>
+              <a:rPr lang="en-IE" dirty="0" err="1"/>
+              <a:t>Deadzone</a:t>
+            </a:r>
             <a:r>
               <a:rPr lang="en-IE" dirty="0"/>
-              <a:t>Mini Golf</a:t>
-            </a:r>
-          </a:p>
-          <a:p>
+              <a:t> helps with maintaining accuracy when aiming</a:t>
+            </a:r>
+          </a:p>
+          <a:p>
+            <a:r>
+              <a:rPr lang="en-IE" dirty="0" err="1"/>
+              <a:t>Raycast</a:t>
+            </a:r>
             <a:r>
               <a:rPr lang="en-IE" dirty="0"/>
-              <a:t>Shooting range</a:t>
-            </a:r>
-          </a:p>
-        </p:txBody>
-      </p:sp>
-      <p:sp>
-        <p:nvSpPr>
-          <p:cNvPr id="4" name="Title 1">
-            <a:extLst>
-              <a:ext uri="{FF2B5EF4-FFF2-40B4-BE49-F238E27FC236}">
-                <a16:creationId xmlns:a16="http://schemas.microsoft.com/office/drawing/2014/main" id="{8748FC09-58D2-41D4-BB20-DAF21BECEFE2}"/>
-              </a:ext>
-            </a:extLst>
-          </p:cNvPr>
-          <p:cNvSpPr txBox="1">
-            <a:spLocks/>
-          </p:cNvSpPr>
-          <p:nvPr/>
-        </p:nvSpPr>
-        <p:spPr>
-          <a:xfrm>
-            <a:off x="6790021" y="685800"/>
-            <a:ext cx="3722841" cy="1752599"/>
-          </a:xfrm>
-          <a:prstGeom prst="rect">
-            <a:avLst/>
-          </a:prstGeom>
-          <a:effectLst/>
-        </p:spPr>
-        <p:txBody>
-          <a:bodyPr vert="horz" lIns="91440" tIns="45720" rIns="91440" bIns="45720" rtlCol="0" anchor="ctr">
-            <a:normAutofit/>
-          </a:bodyPr>
-          <a:lstStyle>
-            <a:lvl1pPr algn="ctr" defTabSz="457200" rtl="0" eaLnBrk="1" latinLnBrk="0" hangingPunct="1">
-              <a:spcBef>
-                <a:spcPct val="0"/>
-              </a:spcBef>
-              <a:buNone/>
-              <a:defRPr sz="4000" kern="1200" cap="none">
-                <a:ln w="3175" cmpd="sng">
-                  <a:noFill/>
-                </a:ln>
-                <a:solidFill>
-                  <a:schemeClr val="tx1"/>
-                </a:solidFill>
-                <a:effectLst/>
-                <a:latin typeface="+mj-lt"/>
-                <a:ea typeface="+mj-ea"/>
-                <a:cs typeface="+mj-cs"/>
-              </a:defRPr>
-            </a:lvl1pPr>
-            <a:lvl2pPr eaLnBrk="1" hangingPunct="1">
-              <a:defRPr>
-                <a:solidFill>
-                  <a:schemeClr val="tx2"/>
-                </a:solidFill>
-              </a:defRPr>
-            </a:lvl2pPr>
-            <a:lvl3pPr eaLnBrk="1" hangingPunct="1">
-              <a:defRPr>
-                <a:solidFill>
-                  <a:schemeClr val="tx2"/>
-                </a:solidFill>
-              </a:defRPr>
-            </a:lvl3pPr>
-            <a:lvl4pPr eaLnBrk="1" hangingPunct="1">
-              <a:defRPr>
-                <a:solidFill>
-                  <a:schemeClr val="tx2"/>
-                </a:solidFill>
-              </a:defRPr>
-            </a:lvl4pPr>
-            <a:lvl5pPr eaLnBrk="1" hangingPunct="1">
-              <a:defRPr>
-                <a:solidFill>
-                  <a:schemeClr val="tx2"/>
-                </a:solidFill>
-              </a:defRPr>
-            </a:lvl5pPr>
-            <a:lvl6pPr eaLnBrk="1" hangingPunct="1">
-              <a:defRPr>
-                <a:solidFill>
-                  <a:schemeClr val="tx2"/>
-                </a:solidFill>
-              </a:defRPr>
-            </a:lvl6pPr>
-            <a:lvl7pPr eaLnBrk="1" hangingPunct="1">
-              <a:defRPr>
-                <a:solidFill>
-                  <a:schemeClr val="tx2"/>
-                </a:solidFill>
-              </a:defRPr>
-            </a:lvl7pPr>
-            <a:lvl8pPr eaLnBrk="1" hangingPunct="1">
-              <a:defRPr>
-                <a:solidFill>
-                  <a:schemeClr val="tx2"/>
-                </a:solidFill>
-              </a:defRPr>
-            </a:lvl8pPr>
-            <a:lvl9pPr eaLnBrk="1" hangingPunct="1">
-              <a:defRPr>
-                <a:solidFill>
-                  <a:schemeClr val="tx2"/>
-                </a:solidFill>
-              </a:defRPr>
-            </a:lvl9pPr>
-          </a:lstStyle>
+              <a:t> detects when a target is hit</a:t>
+            </a:r>
+          </a:p>
           <a:p>
             <a:endParaRPr lang="en-IE" dirty="0"/>
-          </a:p>
-        </p:txBody>
-      </p:sp>
-      <p:sp>
-        <p:nvSpPr>
-          <p:cNvPr id="6" name="Content Placeholder 2">
-            <a:extLst>
-              <a:ext uri="{FF2B5EF4-FFF2-40B4-BE49-F238E27FC236}">
-                <a16:creationId xmlns:a16="http://schemas.microsoft.com/office/drawing/2014/main" id="{05EF0D52-A51C-4F3F-AFF0-BAEF4CDD0EE3}"/>
-              </a:ext>
-            </a:extLst>
-          </p:cNvPr>
-          <p:cNvSpPr txBox="1">
-            <a:spLocks/>
-          </p:cNvSpPr>
-          <p:nvPr/>
-        </p:nvSpPr>
-        <p:spPr>
-          <a:xfrm>
-            <a:off x="7312925" y="2179683"/>
-            <a:ext cx="2677031" cy="3000089"/>
-          </a:xfrm>
-          <a:prstGeom prst="rect">
-            <a:avLst/>
-          </a:prstGeom>
-        </p:spPr>
-        <p:txBody>
-          <a:bodyPr vert="horz" lIns="91440" tIns="45720" rIns="91440" bIns="45720" rtlCol="0" anchor="ctr">
-            <a:normAutofit/>
-          </a:bodyPr>
-          <a:lstStyle>
-            <a:lvl1pPr marL="285750" indent="-285750" algn="l" defTabSz="457200" rtl="0" eaLnBrk="1" latinLnBrk="0" hangingPunct="1">
-              <a:spcBef>
-                <a:spcPct val="20000"/>
-              </a:spcBef>
-              <a:spcAft>
-                <a:spcPts val="600"/>
-              </a:spcAft>
-              <a:buClr>
-                <a:schemeClr val="accent1">
-                  <a:lumMod val="75000"/>
-                </a:schemeClr>
-              </a:buClr>
-              <a:buSzPct val="145000"/>
-              <a:buFont typeface="Arial"/>
-              <a:buChar char="•"/>
-              <a:defRPr sz="2400" kern="1200" cap="none">
-                <a:solidFill>
-                  <a:schemeClr val="tx1"/>
-                </a:solidFill>
-                <a:effectLst/>
-                <a:latin typeface="+mn-lt"/>
-                <a:ea typeface="+mn-ea"/>
-                <a:cs typeface="+mn-cs"/>
-              </a:defRPr>
-            </a:lvl1pPr>
-            <a:lvl2pPr marL="742950" indent="-285750" algn="l" defTabSz="457200" rtl="0" eaLnBrk="1" latinLnBrk="0" hangingPunct="1">
-              <a:spcBef>
-                <a:spcPct val="20000"/>
-              </a:spcBef>
-              <a:spcAft>
-                <a:spcPts val="600"/>
-              </a:spcAft>
-              <a:buClr>
-                <a:schemeClr val="accent1">
-                  <a:lumMod val="75000"/>
-                </a:schemeClr>
-              </a:buClr>
-              <a:buSzPct val="145000"/>
-              <a:buFont typeface="Arial"/>
-              <a:buChar char="•"/>
-              <a:defRPr sz="2000" kern="1200" cap="none">
-                <a:solidFill>
-                  <a:schemeClr val="tx1"/>
-                </a:solidFill>
-                <a:effectLst/>
-                <a:latin typeface="+mn-lt"/>
-                <a:ea typeface="+mn-ea"/>
-                <a:cs typeface="+mn-cs"/>
-              </a:defRPr>
-            </a:lvl2pPr>
-            <a:lvl3pPr marL="1200150" indent="-285750" algn="l" defTabSz="457200" rtl="0" eaLnBrk="1" latinLnBrk="0" hangingPunct="1">
-              <a:spcBef>
-                <a:spcPct val="20000"/>
-              </a:spcBef>
-              <a:spcAft>
-                <a:spcPts val="600"/>
-              </a:spcAft>
-              <a:buClr>
-                <a:schemeClr val="accent1">
-                  <a:lumMod val="75000"/>
-                </a:schemeClr>
-              </a:buClr>
-              <a:buSzPct val="145000"/>
-              <a:buFont typeface="Arial"/>
-              <a:buChar char="•"/>
-              <a:defRPr sz="1800" kern="1200" cap="none">
-                <a:solidFill>
-                  <a:schemeClr val="tx1"/>
-                </a:solidFill>
-                <a:effectLst/>
-                <a:latin typeface="+mn-lt"/>
-                <a:ea typeface="+mn-ea"/>
-                <a:cs typeface="+mn-cs"/>
-              </a:defRPr>
-            </a:lvl3pPr>
-            <a:lvl4pPr marL="1543050" indent="-171450" algn="l" defTabSz="457200" rtl="0" eaLnBrk="1" latinLnBrk="0" hangingPunct="1">
-              <a:spcBef>
-                <a:spcPct val="20000"/>
-              </a:spcBef>
-              <a:spcAft>
-                <a:spcPts val="600"/>
-              </a:spcAft>
-              <a:buClr>
-                <a:schemeClr val="accent1">
-                  <a:lumMod val="75000"/>
-                </a:schemeClr>
-              </a:buClr>
-              <a:buSzPct val="145000"/>
-              <a:buFont typeface="Arial"/>
-              <a:buChar char="•"/>
-              <a:defRPr sz="1600" kern="1200" cap="none">
-                <a:solidFill>
-                  <a:schemeClr val="tx1"/>
-                </a:solidFill>
-                <a:effectLst/>
-                <a:latin typeface="+mn-lt"/>
-                <a:ea typeface="+mn-ea"/>
-                <a:cs typeface="+mn-cs"/>
-              </a:defRPr>
-            </a:lvl4pPr>
-            <a:lvl5pPr marL="2000250" indent="-171450" algn="l" defTabSz="457200" rtl="0" eaLnBrk="1" latinLnBrk="0" hangingPunct="1">
-              <a:spcBef>
-                <a:spcPct val="20000"/>
-              </a:spcBef>
-              <a:spcAft>
-                <a:spcPts val="600"/>
-              </a:spcAft>
-              <a:buClr>
-                <a:schemeClr val="accent1">
-                  <a:lumMod val="75000"/>
-                </a:schemeClr>
-              </a:buClr>
-              <a:buSzPct val="145000"/>
-              <a:buFont typeface="Arial"/>
-              <a:buChar char="•"/>
-              <a:defRPr sz="1400" kern="1200" cap="none">
-                <a:solidFill>
-                  <a:schemeClr val="tx1"/>
-                </a:solidFill>
-                <a:effectLst/>
-                <a:latin typeface="+mn-lt"/>
-                <a:ea typeface="+mn-ea"/>
-                <a:cs typeface="+mn-cs"/>
-              </a:defRPr>
-            </a:lvl5pPr>
-            <a:lvl6pPr marL="2514600" indent="-228600" algn="l" defTabSz="457200" rtl="0" eaLnBrk="1" latinLnBrk="0" hangingPunct="1">
-              <a:spcBef>
-                <a:spcPct val="20000"/>
-              </a:spcBef>
-              <a:spcAft>
-                <a:spcPts val="600"/>
-              </a:spcAft>
-              <a:buClr>
-                <a:schemeClr val="accent1">
-                  <a:lumMod val="75000"/>
-                </a:schemeClr>
-              </a:buClr>
-              <a:buSzPct val="145000"/>
-              <a:buFont typeface="Arial"/>
-              <a:buChar char="•"/>
-              <a:defRPr sz="1400" kern="1200" cap="none">
-                <a:solidFill>
-                  <a:schemeClr val="tx1"/>
-                </a:solidFill>
-                <a:effectLst/>
-                <a:latin typeface="+mn-lt"/>
-                <a:ea typeface="+mn-ea"/>
-                <a:cs typeface="+mn-cs"/>
-              </a:defRPr>
-            </a:lvl6pPr>
-            <a:lvl7pPr marL="2971800" indent="-228600" algn="l" defTabSz="457200" rtl="0" eaLnBrk="1" latinLnBrk="0" hangingPunct="1">
-              <a:spcBef>
-                <a:spcPct val="20000"/>
-              </a:spcBef>
-              <a:spcAft>
-                <a:spcPts val="600"/>
-              </a:spcAft>
-              <a:buClr>
-                <a:schemeClr val="accent1">
-                  <a:lumMod val="75000"/>
-                </a:schemeClr>
-              </a:buClr>
-              <a:buSzPct val="145000"/>
-              <a:buFont typeface="Arial"/>
-              <a:buChar char="•"/>
-              <a:defRPr sz="1400" kern="1200" cap="none">
-                <a:solidFill>
-                  <a:schemeClr val="tx1"/>
-                </a:solidFill>
-                <a:effectLst/>
-                <a:latin typeface="+mn-lt"/>
-                <a:ea typeface="+mn-ea"/>
-                <a:cs typeface="+mn-cs"/>
-              </a:defRPr>
-            </a:lvl7pPr>
-            <a:lvl8pPr marL="3429000" indent="-228600" algn="l" defTabSz="457200" rtl="0" eaLnBrk="1" latinLnBrk="0" hangingPunct="1">
-              <a:spcBef>
-                <a:spcPct val="20000"/>
-              </a:spcBef>
-              <a:spcAft>
-                <a:spcPts val="600"/>
-              </a:spcAft>
-              <a:buClr>
-                <a:schemeClr val="accent1">
-                  <a:lumMod val="75000"/>
-                </a:schemeClr>
-              </a:buClr>
-              <a:buSzPct val="145000"/>
-              <a:buFont typeface="Arial"/>
-              <a:buChar char="•"/>
-              <a:defRPr sz="1400" kern="1200" cap="none">
-                <a:solidFill>
-                  <a:schemeClr val="tx1"/>
-                </a:solidFill>
-                <a:effectLst/>
-                <a:latin typeface="+mn-lt"/>
-                <a:ea typeface="+mn-ea"/>
-                <a:cs typeface="+mn-cs"/>
-              </a:defRPr>
-            </a:lvl8pPr>
-            <a:lvl9pPr marL="3886200" indent="-228600" algn="l" defTabSz="457200" rtl="0" eaLnBrk="1" latinLnBrk="0" hangingPunct="1">
-              <a:spcBef>
-                <a:spcPct val="20000"/>
-              </a:spcBef>
-              <a:spcAft>
-                <a:spcPts val="600"/>
-              </a:spcAft>
-              <a:buClr>
-                <a:schemeClr val="accent1">
-                  <a:lumMod val="75000"/>
-                </a:schemeClr>
-              </a:buClr>
-              <a:buSzPct val="145000"/>
-              <a:buFont typeface="Arial"/>
-              <a:buChar char="•"/>
-              <a:defRPr sz="1400" kern="1200" cap="none">
-                <a:solidFill>
-                  <a:schemeClr val="tx1"/>
-                </a:solidFill>
-                <a:effectLst/>
-                <a:latin typeface="+mn-lt"/>
-                <a:ea typeface="+mn-ea"/>
-                <a:cs typeface="+mn-cs"/>
-              </a:defRPr>
-            </a:lvl9pPr>
-          </a:lstStyle>
-          <a:p>
-            <a:r>
-              <a:rPr lang="en-IE" dirty="0"/>
-              <a:t>360 Degree environment</a:t>
-            </a:r>
-          </a:p>
-          <a:p>
-            <a:r>
-              <a:rPr lang="en-IE" dirty="0"/>
-              <a:t>Static and moving targets</a:t>
-            </a:r>
-          </a:p>
-          <a:p>
-            <a:r>
-              <a:rPr lang="en-IE" dirty="0"/>
-              <a:t>Wild West theme</a:t>
-            </a:r>
           </a:p>
         </p:txBody>
       </p:sp>
     </p:spTree>
     <p:extLst>
       <p:ext uri="{BB962C8B-B14F-4D97-AF65-F5344CB8AC3E}">
-        <p14:creationId xmlns:p14="http://schemas.microsoft.com/office/powerpoint/2010/main" val="2447906685"/>
+        <p14:creationId xmlns:p14="http://schemas.microsoft.com/office/powerpoint/2010/main" val="2570274364"/>
       </p:ext>
     </p:extLst>
   </p:cSld>
@@ -6963,7 +6490,7 @@
           <p:cNvPr id="2" name="Title 1">
             <a:extLst>
               <a:ext uri="{FF2B5EF4-FFF2-40B4-BE49-F238E27FC236}">
-                <a16:creationId xmlns:a16="http://schemas.microsoft.com/office/drawing/2014/main" id="{2F91B12C-ABDD-4383-BA60-7C2FFFF522EE}"/>
+                <a16:creationId xmlns:a16="http://schemas.microsoft.com/office/drawing/2014/main" id="{0A0337E5-D156-424D-846C-92AFEEF2B05B}"/>
               </a:ext>
             </a:extLst>
           </p:cNvPr>
@@ -6980,10 +6507,9 @@
           <a:lstStyle/>
           <a:p>
             <a:r>
-              <a:rPr lang="en-IE" dirty="0" err="1"/>
-              <a:t>Myo</a:t>
-            </a:r>
-            <a:endParaRPr lang="en-IE" dirty="0"/>
+              <a:rPr lang="en-IE" dirty="0"/>
+              <a:t>Gestures</a:t>
+            </a:r>
           </a:p>
         </p:txBody>
       </p:sp>
@@ -6992,7 +6518,7 @@
           <p:cNvPr id="3" name="Content Placeholder 2">
             <a:extLst>
               <a:ext uri="{FF2B5EF4-FFF2-40B4-BE49-F238E27FC236}">
-                <a16:creationId xmlns:a16="http://schemas.microsoft.com/office/drawing/2014/main" id="{2EA01963-FAC3-4CE8-8A12-036CCF76C05D}"/>
+                <a16:creationId xmlns:a16="http://schemas.microsoft.com/office/drawing/2014/main" id="{CD255FCB-05A6-44DC-8A98-6D0CB36A01EE}"/>
               </a:ext>
             </a:extLst>
           </p:cNvPr>
@@ -7003,26 +6529,324 @@
             <p:ph idx="1"/>
           </p:nvPr>
         </p:nvSpPr>
-        <p:spPr/>
+        <p:spPr>
+          <a:xfrm>
+            <a:off x="1484311" y="1752599"/>
+            <a:ext cx="10018713" cy="3038419"/>
+          </a:xfrm>
+        </p:spPr>
         <p:txBody>
           <a:bodyPr/>
           <a:lstStyle/>
           <a:p>
             <a:r>
               <a:rPr lang="en-IE" dirty="0"/>
-              <a:t>Motion/Gesture Controller</a:t>
+              <a:t>Arm movement controls camera</a:t>
             </a:r>
           </a:p>
           <a:p>
             <a:r>
               <a:rPr lang="en-IE" dirty="0"/>
-              <a:t>Can read a persons arm movements and hand gestures.</a:t>
+              <a:t>Fist gesture to shoot (like squeezing a trigger)</a:t>
             </a:r>
           </a:p>
           <a:p>
             <a:r>
               <a:rPr lang="en-IE" dirty="0"/>
-              <a:t>Working with Unity – Armband as the controller.</a:t>
+              <a:t>Double tap to recalibrate aiming</a:t>
+            </a:r>
+          </a:p>
+          <a:p>
+            <a:r>
+              <a:rPr lang="en-IE" dirty="0"/>
+              <a:t>Wave in and out to open and close pause menu (sliding it in and out of scene)</a:t>
+            </a:r>
+          </a:p>
+        </p:txBody>
+      </p:sp>
+      <p:sp>
+        <p:nvSpPr>
+          <p:cNvPr id="4" name="TextBox 3">
+            <a:extLst>
+              <a:ext uri="{FF2B5EF4-FFF2-40B4-BE49-F238E27FC236}">
+                <a16:creationId xmlns:a16="http://schemas.microsoft.com/office/drawing/2014/main" id="{33C3E0BC-A204-444A-BBE3-C6AAEA83CC52}"/>
+              </a:ext>
+            </a:extLst>
+          </p:cNvPr>
+          <p:cNvSpPr txBox="1"/>
+          <p:nvPr/>
+        </p:nvSpPr>
+        <p:spPr>
+          <a:xfrm>
+            <a:off x="5574008" y="1795947"/>
+            <a:ext cx="4338471" cy="369332"/>
+          </a:xfrm>
+          <a:prstGeom prst="rect">
+            <a:avLst/>
+          </a:prstGeom>
+          <a:noFill/>
+        </p:spPr>
+        <p:txBody>
+          <a:bodyPr wrap="square" rtlCol="0">
+            <a:spAutoFit/>
+          </a:bodyPr>
+          <a:lstStyle/>
+          <a:p>
+            <a:r>
+              <a:rPr lang="en-IE" dirty="0"/>
+              <a:t>During gameplay</a:t>
+            </a:r>
+          </a:p>
+        </p:txBody>
+      </p:sp>
+      <p:pic>
+        <p:nvPicPr>
+          <p:cNvPr id="6" name="Picture 5">
+            <a:extLst>
+              <a:ext uri="{FF2B5EF4-FFF2-40B4-BE49-F238E27FC236}">
+                <a16:creationId xmlns:a16="http://schemas.microsoft.com/office/drawing/2014/main" id="{C95A32B8-1C19-4711-A8EE-864DB5A7B794}"/>
+              </a:ext>
+            </a:extLst>
+          </p:cNvPr>
+          <p:cNvPicPr>
+            <a:picLocks noChangeAspect="1"/>
+          </p:cNvPicPr>
+          <p:nvPr/>
+        </p:nvPicPr>
+        <p:blipFill>
+          <a:blip r:embed="rId2">
+            <a:extLst>
+              <a:ext uri="{28A0092B-C50C-407E-A947-70E740481C1C}">
+                <a14:useLocalDpi xmlns:a14="http://schemas.microsoft.com/office/drawing/2010/main" val="0"/>
+              </a:ext>
+            </a:extLst>
+          </a:blip>
+          <a:stretch>
+            <a:fillRect/>
+          </a:stretch>
+        </p:blipFill>
+        <p:spPr>
+          <a:xfrm>
+            <a:off x="2255585" y="4419602"/>
+            <a:ext cx="1581150" cy="1581150"/>
+          </a:xfrm>
+          <a:prstGeom prst="rect">
+            <a:avLst/>
+          </a:prstGeom>
+        </p:spPr>
+      </p:pic>
+      <p:sp>
+        <p:nvSpPr>
+          <p:cNvPr id="7" name="TextBox 6">
+            <a:extLst>
+              <a:ext uri="{FF2B5EF4-FFF2-40B4-BE49-F238E27FC236}">
+                <a16:creationId xmlns:a16="http://schemas.microsoft.com/office/drawing/2014/main" id="{8C52473E-275F-4A94-8A51-F8F02A84EE71}"/>
+              </a:ext>
+            </a:extLst>
+          </p:cNvPr>
+          <p:cNvSpPr txBox="1"/>
+          <p:nvPr/>
+        </p:nvSpPr>
+        <p:spPr>
+          <a:xfrm>
+            <a:off x="2301356" y="6139251"/>
+            <a:ext cx="1489608" cy="369332"/>
+          </a:xfrm>
+          <a:prstGeom prst="rect">
+            <a:avLst/>
+          </a:prstGeom>
+          <a:noFill/>
+        </p:spPr>
+        <p:txBody>
+          <a:bodyPr wrap="square" rtlCol="0">
+            <a:spAutoFit/>
+          </a:bodyPr>
+          <a:lstStyle/>
+          <a:p>
+            <a:pPr algn="ctr"/>
+            <a:r>
+              <a:rPr lang="en-IE" dirty="0"/>
+              <a:t>Fist to shoot</a:t>
+            </a:r>
+          </a:p>
+        </p:txBody>
+      </p:sp>
+      <p:pic>
+        <p:nvPicPr>
+          <p:cNvPr id="9" name="Picture 8">
+            <a:extLst>
+              <a:ext uri="{FF2B5EF4-FFF2-40B4-BE49-F238E27FC236}">
+                <a16:creationId xmlns:a16="http://schemas.microsoft.com/office/drawing/2014/main" id="{E01A5FCF-17D2-4A72-B431-50A42F56D3D9}"/>
+              </a:ext>
+            </a:extLst>
+          </p:cNvPr>
+          <p:cNvPicPr>
+            <a:picLocks noChangeAspect="1"/>
+          </p:cNvPicPr>
+          <p:nvPr/>
+        </p:nvPicPr>
+        <p:blipFill>
+          <a:blip r:embed="rId3">
+            <a:extLst>
+              <a:ext uri="{28A0092B-C50C-407E-A947-70E740481C1C}">
+                <a14:useLocalDpi xmlns:a14="http://schemas.microsoft.com/office/drawing/2010/main" val="0"/>
+              </a:ext>
+            </a:extLst>
+          </a:blip>
+          <a:stretch>
+            <a:fillRect/>
+          </a:stretch>
+        </p:blipFill>
+        <p:spPr>
+          <a:xfrm>
+            <a:off x="7500154" y="4419602"/>
+            <a:ext cx="1590675" cy="1581150"/>
+          </a:xfrm>
+          <a:prstGeom prst="rect">
+            <a:avLst/>
+          </a:prstGeom>
+        </p:spPr>
+      </p:pic>
+      <p:pic>
+        <p:nvPicPr>
+          <p:cNvPr id="11" name="Picture 10">
+            <a:extLst>
+              <a:ext uri="{FF2B5EF4-FFF2-40B4-BE49-F238E27FC236}">
+                <a16:creationId xmlns:a16="http://schemas.microsoft.com/office/drawing/2014/main" id="{13B51B71-CFA0-4AB8-B8CD-156681A9AD9E}"/>
+              </a:ext>
+            </a:extLst>
+          </p:cNvPr>
+          <p:cNvPicPr>
+            <a:picLocks noChangeAspect="1"/>
+          </p:cNvPicPr>
+          <p:nvPr/>
+        </p:nvPicPr>
+        <p:blipFill>
+          <a:blip r:embed="rId4">
+            <a:extLst>
+              <a:ext uri="{28A0092B-C50C-407E-A947-70E740481C1C}">
+                <a14:useLocalDpi xmlns:a14="http://schemas.microsoft.com/office/drawing/2010/main" val="0"/>
+              </a:ext>
+            </a:extLst>
+          </a:blip>
+          <a:stretch>
+            <a:fillRect/>
+          </a:stretch>
+        </p:blipFill>
+        <p:spPr>
+          <a:xfrm>
+            <a:off x="9191611" y="4419602"/>
+            <a:ext cx="1590675" cy="1581150"/>
+          </a:xfrm>
+          <a:prstGeom prst="rect">
+            <a:avLst/>
+          </a:prstGeom>
+        </p:spPr>
+      </p:pic>
+      <p:sp>
+        <p:nvSpPr>
+          <p:cNvPr id="12" name="TextBox 11">
+            <a:extLst>
+              <a:ext uri="{FF2B5EF4-FFF2-40B4-BE49-F238E27FC236}">
+                <a16:creationId xmlns:a16="http://schemas.microsoft.com/office/drawing/2014/main" id="{A340BBEE-2301-4ABF-975B-B4285D46A8E4}"/>
+              </a:ext>
+            </a:extLst>
+          </p:cNvPr>
+          <p:cNvSpPr txBox="1"/>
+          <p:nvPr/>
+        </p:nvSpPr>
+        <p:spPr>
+          <a:xfrm>
+            <a:off x="8396416" y="6000752"/>
+            <a:ext cx="1489608" cy="646331"/>
+          </a:xfrm>
+          <a:prstGeom prst="rect">
+            <a:avLst/>
+          </a:prstGeom>
+          <a:noFill/>
+        </p:spPr>
+        <p:txBody>
+          <a:bodyPr wrap="square" rtlCol="0">
+            <a:spAutoFit/>
+          </a:bodyPr>
+          <a:lstStyle/>
+          <a:p>
+            <a:pPr algn="ctr"/>
+            <a:r>
+              <a:rPr lang="en-IE" dirty="0"/>
+              <a:t>Wave in and out to pause</a:t>
+            </a:r>
+          </a:p>
+        </p:txBody>
+      </p:sp>
+      <p:pic>
+        <p:nvPicPr>
+          <p:cNvPr id="14" name="Picture 13">
+            <a:extLst>
+              <a:ext uri="{FF2B5EF4-FFF2-40B4-BE49-F238E27FC236}">
+                <a16:creationId xmlns:a16="http://schemas.microsoft.com/office/drawing/2014/main" id="{2605FF6E-B5F1-476A-A0A4-23ABE6D7E191}"/>
+              </a:ext>
+            </a:extLst>
+          </p:cNvPr>
+          <p:cNvPicPr>
+            <a:picLocks noChangeAspect="1"/>
+          </p:cNvPicPr>
+          <p:nvPr/>
+        </p:nvPicPr>
+        <p:blipFill>
+          <a:blip r:embed="rId5">
+            <a:extLst>
+              <a:ext uri="{28A0092B-C50C-407E-A947-70E740481C1C}">
+                <a14:useLocalDpi xmlns:a14="http://schemas.microsoft.com/office/drawing/2010/main" val="0"/>
+              </a:ext>
+            </a:extLst>
+          </a:blip>
+          <a:stretch>
+            <a:fillRect/>
+          </a:stretch>
+        </p:blipFill>
+        <p:spPr>
+          <a:xfrm>
+            <a:off x="4366992" y="4419601"/>
+            <a:ext cx="2602905" cy="1581151"/>
+          </a:xfrm>
+          <a:prstGeom prst="rect">
+            <a:avLst/>
+          </a:prstGeom>
+        </p:spPr>
+      </p:pic>
+      <p:sp>
+        <p:nvSpPr>
+          <p:cNvPr id="15" name="TextBox 14">
+            <a:extLst>
+              <a:ext uri="{FF2B5EF4-FFF2-40B4-BE49-F238E27FC236}">
+                <a16:creationId xmlns:a16="http://schemas.microsoft.com/office/drawing/2014/main" id="{5408412E-2835-4DB9-BBFC-2E3C8770959D}"/>
+              </a:ext>
+            </a:extLst>
+          </p:cNvPr>
+          <p:cNvSpPr txBox="1"/>
+          <p:nvPr/>
+        </p:nvSpPr>
+        <p:spPr>
+          <a:xfrm>
+            <a:off x="4923640" y="6000752"/>
+            <a:ext cx="1489608" cy="646331"/>
+          </a:xfrm>
+          <a:prstGeom prst="rect">
+            <a:avLst/>
+          </a:prstGeom>
+          <a:noFill/>
+        </p:spPr>
+        <p:txBody>
+          <a:bodyPr wrap="square" rtlCol="0">
+            <a:spAutoFit/>
+          </a:bodyPr>
+          <a:lstStyle/>
+          <a:p>
+            <a:pPr algn="ctr"/>
+            <a:r>
+              <a:rPr lang="en-IE" dirty="0"/>
+              <a:t>Double tap to recalibrate</a:t>
             </a:r>
           </a:p>
         </p:txBody>
@@ -7030,7 +6854,7 @@
     </p:spTree>
     <p:extLst>
       <p:ext uri="{BB962C8B-B14F-4D97-AF65-F5344CB8AC3E}">
-        <p14:creationId xmlns:p14="http://schemas.microsoft.com/office/powerpoint/2010/main" val="2570274364"/>
+        <p14:creationId xmlns:p14="http://schemas.microsoft.com/office/powerpoint/2010/main" val="3364931373"/>
       </p:ext>
     </p:extLst>
   </p:cSld>
@@ -7062,7 +6886,7 @@
           <p:cNvPr id="2" name="Title 1">
             <a:extLst>
               <a:ext uri="{FF2B5EF4-FFF2-40B4-BE49-F238E27FC236}">
-                <a16:creationId xmlns:a16="http://schemas.microsoft.com/office/drawing/2014/main" id="{5845DEFE-B671-451D-9DFE-9A9E6C3E872F}"/>
+                <a16:creationId xmlns:a16="http://schemas.microsoft.com/office/drawing/2014/main" id="{0A0337E5-D156-424D-846C-92AFEEF2B05B}"/>
               </a:ext>
             </a:extLst>
           </p:cNvPr>
@@ -7080,88 +6904,56 @@
           <a:p>
             <a:r>
               <a:rPr lang="en-IE" dirty="0"/>
-              <a:t>Code Example</a:t>
-            </a:r>
-          </a:p>
-        </p:txBody>
-      </p:sp>
-      <p:pic>
-        <p:nvPicPr>
-          <p:cNvPr id="10" name="Content Placeholder 9">
+              <a:t>Gestures</a:t>
+            </a:r>
+          </a:p>
+        </p:txBody>
+      </p:sp>
+      <p:sp>
+        <p:nvSpPr>
+          <p:cNvPr id="3" name="Content Placeholder 2">
             <a:extLst>
               <a:ext uri="{FF2B5EF4-FFF2-40B4-BE49-F238E27FC236}">
-                <a16:creationId xmlns:a16="http://schemas.microsoft.com/office/drawing/2014/main" id="{CF35CE84-C011-4B80-931F-80419821778E}"/>
+                <a16:creationId xmlns:a16="http://schemas.microsoft.com/office/drawing/2014/main" id="{CD255FCB-05A6-44DC-8A98-6D0CB36A01EE}"/>
               </a:ext>
             </a:extLst>
           </p:cNvPr>
-          <p:cNvPicPr>
-            <a:picLocks noGrp="1" noChangeAspect="1"/>
-          </p:cNvPicPr>
+          <p:cNvSpPr>
+            <a:spLocks noGrp="1"/>
+          </p:cNvSpPr>
           <p:nvPr>
             <p:ph idx="1"/>
           </p:nvPr>
-        </p:nvPicPr>
-        <p:blipFill>
-          <a:blip r:embed="rId2">
-            <a:extLst>
-              <a:ext uri="{28A0092B-C50C-407E-A947-70E740481C1C}">
-                <a14:useLocalDpi xmlns:a14="http://schemas.microsoft.com/office/drawing/2010/main" val="0"/>
-              </a:ext>
-            </a:extLst>
-          </a:blip>
-          <a:stretch>
-            <a:fillRect/>
-          </a:stretch>
-        </p:blipFill>
+        </p:nvSpPr>
         <p:spPr>
           <a:xfrm>
-            <a:off x="1484311" y="3544440"/>
-            <a:ext cx="3069040" cy="1924318"/>
+            <a:off x="1484311" y="2382276"/>
+            <a:ext cx="10018713" cy="1921427"/>
           </a:xfrm>
         </p:spPr>
-      </p:pic>
-      <p:pic>
-        <p:nvPicPr>
-          <p:cNvPr id="12" name="Picture 11">
+        <p:txBody>
+          <a:bodyPr/>
+          <a:lstStyle/>
+          <a:p>
+            <a:r>
+              <a:rPr lang="en-IE" dirty="0"/>
+              <a:t>Arm movement deactivated</a:t>
+            </a:r>
+          </a:p>
+          <a:p>
+            <a:r>
+              <a:rPr lang="en-IE" dirty="0"/>
+              <a:t>Each gesture mapped to a button on screen (Spread fingers to view controls, Wave in to play, etc.)</a:t>
+            </a:r>
+          </a:p>
+        </p:txBody>
+      </p:sp>
+      <p:sp>
+        <p:nvSpPr>
+          <p:cNvPr id="4" name="TextBox 3">
             <a:extLst>
               <a:ext uri="{FF2B5EF4-FFF2-40B4-BE49-F238E27FC236}">
-                <a16:creationId xmlns:a16="http://schemas.microsoft.com/office/drawing/2014/main" id="{FE94B303-FC10-4458-86AF-43DB2AC77261}"/>
-              </a:ext>
-            </a:extLst>
-          </p:cNvPr>
-          <p:cNvPicPr>
-            <a:picLocks noChangeAspect="1"/>
-          </p:cNvPicPr>
-          <p:nvPr/>
-        </p:nvPicPr>
-        <p:blipFill>
-          <a:blip r:embed="rId3">
-            <a:extLst>
-              <a:ext uri="{28A0092B-C50C-407E-A947-70E740481C1C}">
-                <a14:useLocalDpi xmlns:a14="http://schemas.microsoft.com/office/drawing/2010/main" val="0"/>
-              </a:ext>
-            </a:extLst>
-          </a:blip>
-          <a:stretch>
-            <a:fillRect/>
-          </a:stretch>
-        </p:blipFill>
-        <p:spPr>
-          <a:xfrm>
-            <a:off x="5113046" y="3544440"/>
-            <a:ext cx="6925642" cy="1924319"/>
-          </a:xfrm>
-          <a:prstGeom prst="rect">
-            <a:avLst/>
-          </a:prstGeom>
-        </p:spPr>
-      </p:pic>
-      <p:sp>
-        <p:nvSpPr>
-          <p:cNvPr id="3" name="TextBox 2">
-            <a:extLst>
-              <a:ext uri="{FF2B5EF4-FFF2-40B4-BE49-F238E27FC236}">
-                <a16:creationId xmlns:a16="http://schemas.microsoft.com/office/drawing/2014/main" id="{96A74A28-F767-4620-9EB6-5C2EE30A84A4}"/>
+                <a16:creationId xmlns:a16="http://schemas.microsoft.com/office/drawing/2014/main" id="{33C3E0BC-A204-444A-BBE3-C6AAEA83CC52}"/>
               </a:ext>
             </a:extLst>
           </p:cNvPr>
@@ -7169,9 +6961,9 @@
           <p:nvPr/>
         </p:nvSpPr>
         <p:spPr>
-          <a:xfrm flipH="1">
-            <a:off x="1484311" y="2438399"/>
-            <a:ext cx="2938401" cy="646331"/>
+          <a:xfrm>
+            <a:off x="5574008" y="1795947"/>
+            <a:ext cx="4338471" cy="369332"/>
           </a:xfrm>
           <a:prstGeom prst="rect">
             <a:avLst/>
@@ -7186,42 +6978,7 @@
           <a:p>
             <a:r>
               <a:rPr lang="en-IE" dirty="0"/>
-              <a:t>We first determine the gesture currently active </a:t>
-            </a:r>
-          </a:p>
-        </p:txBody>
-      </p:sp>
-      <p:sp>
-        <p:nvSpPr>
-          <p:cNvPr id="6" name="TextBox 5">
-            <a:extLst>
-              <a:ext uri="{FF2B5EF4-FFF2-40B4-BE49-F238E27FC236}">
-                <a16:creationId xmlns:a16="http://schemas.microsoft.com/office/drawing/2014/main" id="{B7E9725A-E75B-4AAF-B884-837CEE869FC1}"/>
-              </a:ext>
-            </a:extLst>
-          </p:cNvPr>
-          <p:cNvSpPr txBox="1"/>
-          <p:nvPr/>
-        </p:nvSpPr>
-        <p:spPr>
-          <a:xfrm flipH="1">
-            <a:off x="5113046" y="2438398"/>
-            <a:ext cx="2938401" cy="646331"/>
-          </a:xfrm>
-          <a:prstGeom prst="rect">
-            <a:avLst/>
-          </a:prstGeom>
-          <a:noFill/>
-        </p:spPr>
-        <p:txBody>
-          <a:bodyPr wrap="square" rtlCol="0">
-            <a:spAutoFit/>
-          </a:bodyPr>
-          <a:lstStyle/>
-          <a:p>
-            <a:r>
-              <a:rPr lang="en-IE" dirty="0"/>
-              <a:t>And call a corresponding method e.g. Shoot() </a:t>
+              <a:t>During menus</a:t>
             </a:r>
           </a:p>
         </p:txBody>
@@ -7229,7 +6986,7 @@
     </p:spTree>
     <p:extLst>
       <p:ext uri="{BB962C8B-B14F-4D97-AF65-F5344CB8AC3E}">
-        <p14:creationId xmlns:p14="http://schemas.microsoft.com/office/powerpoint/2010/main" val="3118762054"/>
+        <p14:creationId xmlns:p14="http://schemas.microsoft.com/office/powerpoint/2010/main" val="3301260116"/>
       </p:ext>
     </p:extLst>
   </p:cSld>
@@ -7261,7 +7018,7 @@
           <p:cNvPr id="2" name="Title 1">
             <a:extLst>
               <a:ext uri="{FF2B5EF4-FFF2-40B4-BE49-F238E27FC236}">
-                <a16:creationId xmlns:a16="http://schemas.microsoft.com/office/drawing/2014/main" id="{1227DCA5-0AAC-47ED-A083-CAD30DA1447D}"/>
+                <a16:creationId xmlns:a16="http://schemas.microsoft.com/office/drawing/2014/main" id="{0669A358-A43E-434A-B0D2-4DCBD5BCFC50}"/>
               </a:ext>
             </a:extLst>
           </p:cNvPr>
@@ -7279,7 +7036,7 @@
           <a:p>
             <a:r>
               <a:rPr lang="en-IE" dirty="0"/>
-              <a:t>Development</a:t>
+              <a:t>Taking Myo Input</a:t>
             </a:r>
           </a:p>
         </p:txBody>
@@ -7289,7 +7046,7 @@
           <p:cNvPr id="3" name="Content Placeholder 2">
             <a:extLst>
               <a:ext uri="{FF2B5EF4-FFF2-40B4-BE49-F238E27FC236}">
-                <a16:creationId xmlns:a16="http://schemas.microsoft.com/office/drawing/2014/main" id="{205A3C45-2057-4879-A4BB-E9036795405D}"/>
+                <a16:creationId xmlns:a16="http://schemas.microsoft.com/office/drawing/2014/main" id="{6582EA4D-B555-4EA8-B96D-65EE49823A45}"/>
               </a:ext>
             </a:extLst>
           </p:cNvPr>
@@ -7307,25 +7064,46 @@
           <a:p>
             <a:r>
               <a:rPr lang="en-IE" dirty="0"/>
-              <a:t>Started with setting up the scene with blank objects.</a:t>
-            </a:r>
-          </a:p>
-          <a:p>
+              <a:t>Take in </a:t>
+            </a:r>
+            <a:r>
+              <a:rPr lang="en-IE" dirty="0" err="1"/>
+              <a:t>eularAngles</a:t>
+            </a:r>
             <a:r>
               <a:rPr lang="en-IE" dirty="0"/>
-              <a:t>Worked on that and what mechanics to implement.</a:t>
-            </a:r>
+              <a:t> from </a:t>
+            </a:r>
+            <a:r>
+              <a:rPr lang="en-IE" dirty="0" err="1"/>
+              <a:t>myo.localRotation</a:t>
+            </a:r>
+            <a:endParaRPr lang="en-IE" dirty="0"/>
           </a:p>
           <a:p>
             <a:r>
               <a:rPr lang="en-IE" dirty="0"/>
-              <a:t>Get the movement and shooting working with mouse + keyboard</a:t>
-            </a:r>
-          </a:p>
-          <a:p>
+              <a:t>Check if the angle has passed the </a:t>
+            </a:r>
+            <a:r>
+              <a:rPr lang="en-IE" dirty="0" err="1"/>
+              <a:t>deadzone</a:t>
+            </a:r>
             <a:r>
               <a:rPr lang="en-IE" dirty="0"/>
-              <a:t>Transitioned to Myo controls once working.</a:t>
+              <a:t> boundary in 4 directions</a:t>
+            </a:r>
+          </a:p>
+          <a:p>
+            <a:r>
+              <a:rPr lang="en-IE" dirty="0"/>
+              <a:t>If it has, apply a rotation speed to the camera in that direction</a:t>
+            </a:r>
+          </a:p>
+          <a:p>
+            <a:r>
+              <a:rPr lang="en-IE" dirty="0"/>
+              <a:t>Also check for gestures and apply appropriate actions </a:t>
             </a:r>
           </a:p>
         </p:txBody>
@@ -7333,682 +7111,7 @@
     </p:spTree>
     <p:extLst>
       <p:ext uri="{BB962C8B-B14F-4D97-AF65-F5344CB8AC3E}">
-        <p14:creationId xmlns:p14="http://schemas.microsoft.com/office/powerpoint/2010/main" val="915025158"/>
-      </p:ext>
-    </p:extLst>
-  </p:cSld>
-  <p:clrMapOvr>
-    <a:masterClrMapping/>
-  </p:clrMapOvr>
-</p:sld>
-</file>
-
-<file path=ppt/slides/slide7.xml><?xml version="1.0" encoding="utf-8"?>
-<p:sld xmlns:a="http://schemas.openxmlformats.org/drawingml/2006/main" xmlns:r="http://schemas.openxmlformats.org/officeDocument/2006/relationships" xmlns:p="http://schemas.openxmlformats.org/presentationml/2006/main">
-  <p:cSld>
-    <p:spTree>
-      <p:nvGrpSpPr>
-        <p:cNvPr id="1" name=""/>
-        <p:cNvGrpSpPr/>
-        <p:nvPr/>
-      </p:nvGrpSpPr>
-      <p:grpSpPr>
-        <a:xfrm>
-          <a:off x="0" y="0"/>
-          <a:ext cx="0" cy="0"/>
-          <a:chOff x="0" y="0"/>
-          <a:chExt cx="0" cy="0"/>
-        </a:xfrm>
-      </p:grpSpPr>
-      <p:sp>
-        <p:nvSpPr>
-          <p:cNvPr id="2" name="Title 1">
-            <a:extLst>
-              <a:ext uri="{FF2B5EF4-FFF2-40B4-BE49-F238E27FC236}">
-                <a16:creationId xmlns:a16="http://schemas.microsoft.com/office/drawing/2014/main" id="{EF45A583-A5C2-4900-86EC-0843AF625DD4}"/>
-              </a:ext>
-            </a:extLst>
-          </p:cNvPr>
-          <p:cNvSpPr>
-            <a:spLocks noGrp="1"/>
-          </p:cNvSpPr>
-          <p:nvPr>
-            <p:ph type="title"/>
-          </p:nvPr>
-        </p:nvSpPr>
-        <p:spPr/>
-        <p:txBody>
-          <a:bodyPr/>
-          <a:lstStyle/>
-          <a:p>
-            <a:r>
-              <a:rPr lang="en-IE" dirty="0"/>
-              <a:t>Gestures</a:t>
-            </a:r>
-          </a:p>
-        </p:txBody>
-      </p:sp>
-      <p:sp>
-        <p:nvSpPr>
-          <p:cNvPr id="3" name="Content Placeholder 2">
-            <a:extLst>
-              <a:ext uri="{FF2B5EF4-FFF2-40B4-BE49-F238E27FC236}">
-                <a16:creationId xmlns:a16="http://schemas.microsoft.com/office/drawing/2014/main" id="{E0B63117-36A4-4C1E-A4C9-34F9FEE909E9}"/>
-              </a:ext>
-            </a:extLst>
-          </p:cNvPr>
-          <p:cNvSpPr>
-            <a:spLocks noGrp="1"/>
-          </p:cNvSpPr>
-          <p:nvPr>
-            <p:ph idx="1"/>
-          </p:nvPr>
-        </p:nvSpPr>
-        <p:spPr>
-          <a:xfrm>
-            <a:off x="1381674" y="1093236"/>
-            <a:ext cx="10018713" cy="3124201"/>
-          </a:xfrm>
-        </p:spPr>
-        <p:txBody>
-          <a:bodyPr/>
-          <a:lstStyle/>
-          <a:p>
-            <a:r>
-              <a:rPr lang="en-IE" dirty="0"/>
-              <a:t>Camera is controlled by moving your arm.</a:t>
-            </a:r>
-          </a:p>
-          <a:p>
-            <a:endParaRPr lang="en-IE" dirty="0"/>
-          </a:p>
-        </p:txBody>
-      </p:sp>
-      <p:pic>
-        <p:nvPicPr>
-          <p:cNvPr id="5" name="Picture 4">
-            <a:extLst>
-              <a:ext uri="{FF2B5EF4-FFF2-40B4-BE49-F238E27FC236}">
-                <a16:creationId xmlns:a16="http://schemas.microsoft.com/office/drawing/2014/main" id="{9C09C7DC-98C3-4FDF-9EFA-3BA6966CAE0A}"/>
-              </a:ext>
-            </a:extLst>
-          </p:cNvPr>
-          <p:cNvPicPr>
-            <a:picLocks noChangeAspect="1"/>
-          </p:cNvPicPr>
-          <p:nvPr/>
-        </p:nvPicPr>
-        <p:blipFill>
-          <a:blip r:embed="rId2">
-            <a:clrChange>
-              <a:clrFrom>
-                <a:srgbClr val="FFFFFF"/>
-              </a:clrFrom>
-              <a:clrTo>
-                <a:srgbClr val="FFFFFF">
-                  <a:alpha val="0"/>
-                </a:srgbClr>
-              </a:clrTo>
-            </a:clrChange>
-            <a:extLst>
-              <a:ext uri="{28A0092B-C50C-407E-A947-70E740481C1C}">
-                <a14:useLocalDpi xmlns:a14="http://schemas.microsoft.com/office/drawing/2010/main" val="0"/>
-              </a:ext>
-            </a:extLst>
-          </a:blip>
-          <a:stretch>
-            <a:fillRect/>
-          </a:stretch>
-        </p:blipFill>
-        <p:spPr>
-          <a:xfrm>
-            <a:off x="1794588" y="2638407"/>
-            <a:ext cx="4083698" cy="3158060"/>
-          </a:xfrm>
-          <a:prstGeom prst="rect">
-            <a:avLst/>
-          </a:prstGeom>
-        </p:spPr>
-      </p:pic>
-      <p:sp>
-        <p:nvSpPr>
-          <p:cNvPr id="6" name="Content Placeholder 2">
-            <a:extLst>
-              <a:ext uri="{FF2B5EF4-FFF2-40B4-BE49-F238E27FC236}">
-                <a16:creationId xmlns:a16="http://schemas.microsoft.com/office/drawing/2014/main" id="{82E08D62-BAEC-4B02-9CFA-C7E4BB237841}"/>
-              </a:ext>
-            </a:extLst>
-          </p:cNvPr>
-          <p:cNvSpPr txBox="1">
-            <a:spLocks/>
-          </p:cNvSpPr>
-          <p:nvPr/>
-        </p:nvSpPr>
-        <p:spPr>
-          <a:xfrm>
-            <a:off x="6150789" y="2655335"/>
-            <a:ext cx="5484539" cy="3597627"/>
-          </a:xfrm>
-          <a:prstGeom prst="rect">
-            <a:avLst/>
-          </a:prstGeom>
-        </p:spPr>
-        <p:txBody>
-          <a:bodyPr vert="horz" lIns="91440" tIns="45720" rIns="91440" bIns="45720" rtlCol="0" anchor="ctr">
-            <a:normAutofit/>
-          </a:bodyPr>
-          <a:lstStyle>
-            <a:lvl1pPr marL="285750" indent="-285750" algn="l" defTabSz="457200" rtl="0" eaLnBrk="1" latinLnBrk="0" hangingPunct="1">
-              <a:spcBef>
-                <a:spcPct val="20000"/>
-              </a:spcBef>
-              <a:spcAft>
-                <a:spcPts val="600"/>
-              </a:spcAft>
-              <a:buClr>
-                <a:schemeClr val="accent1">
-                  <a:lumMod val="75000"/>
-                </a:schemeClr>
-              </a:buClr>
-              <a:buSzPct val="145000"/>
-              <a:buFont typeface="Arial"/>
-              <a:buChar char="•"/>
-              <a:defRPr sz="2400" kern="1200" cap="none">
-                <a:solidFill>
-                  <a:schemeClr val="tx1"/>
-                </a:solidFill>
-                <a:effectLst/>
-                <a:latin typeface="+mn-lt"/>
-                <a:ea typeface="+mn-ea"/>
-                <a:cs typeface="+mn-cs"/>
-              </a:defRPr>
-            </a:lvl1pPr>
-            <a:lvl2pPr marL="742950" indent="-285750" algn="l" defTabSz="457200" rtl="0" eaLnBrk="1" latinLnBrk="0" hangingPunct="1">
-              <a:spcBef>
-                <a:spcPct val="20000"/>
-              </a:spcBef>
-              <a:spcAft>
-                <a:spcPts val="600"/>
-              </a:spcAft>
-              <a:buClr>
-                <a:schemeClr val="accent1">
-                  <a:lumMod val="75000"/>
-                </a:schemeClr>
-              </a:buClr>
-              <a:buSzPct val="145000"/>
-              <a:buFont typeface="Arial"/>
-              <a:buChar char="•"/>
-              <a:defRPr sz="2000" kern="1200" cap="none">
-                <a:solidFill>
-                  <a:schemeClr val="tx1"/>
-                </a:solidFill>
-                <a:effectLst/>
-                <a:latin typeface="+mn-lt"/>
-                <a:ea typeface="+mn-ea"/>
-                <a:cs typeface="+mn-cs"/>
-              </a:defRPr>
-            </a:lvl2pPr>
-            <a:lvl3pPr marL="1200150" indent="-285750" algn="l" defTabSz="457200" rtl="0" eaLnBrk="1" latinLnBrk="0" hangingPunct="1">
-              <a:spcBef>
-                <a:spcPct val="20000"/>
-              </a:spcBef>
-              <a:spcAft>
-                <a:spcPts val="600"/>
-              </a:spcAft>
-              <a:buClr>
-                <a:schemeClr val="accent1">
-                  <a:lumMod val="75000"/>
-                </a:schemeClr>
-              </a:buClr>
-              <a:buSzPct val="145000"/>
-              <a:buFont typeface="Arial"/>
-              <a:buChar char="•"/>
-              <a:defRPr sz="1800" kern="1200" cap="none">
-                <a:solidFill>
-                  <a:schemeClr val="tx1"/>
-                </a:solidFill>
-                <a:effectLst/>
-                <a:latin typeface="+mn-lt"/>
-                <a:ea typeface="+mn-ea"/>
-                <a:cs typeface="+mn-cs"/>
-              </a:defRPr>
-            </a:lvl3pPr>
-            <a:lvl4pPr marL="1543050" indent="-171450" algn="l" defTabSz="457200" rtl="0" eaLnBrk="1" latinLnBrk="0" hangingPunct="1">
-              <a:spcBef>
-                <a:spcPct val="20000"/>
-              </a:spcBef>
-              <a:spcAft>
-                <a:spcPts val="600"/>
-              </a:spcAft>
-              <a:buClr>
-                <a:schemeClr val="accent1">
-                  <a:lumMod val="75000"/>
-                </a:schemeClr>
-              </a:buClr>
-              <a:buSzPct val="145000"/>
-              <a:buFont typeface="Arial"/>
-              <a:buChar char="•"/>
-              <a:defRPr sz="1600" kern="1200" cap="none">
-                <a:solidFill>
-                  <a:schemeClr val="tx1"/>
-                </a:solidFill>
-                <a:effectLst/>
-                <a:latin typeface="+mn-lt"/>
-                <a:ea typeface="+mn-ea"/>
-                <a:cs typeface="+mn-cs"/>
-              </a:defRPr>
-            </a:lvl4pPr>
-            <a:lvl5pPr marL="2000250" indent="-171450" algn="l" defTabSz="457200" rtl="0" eaLnBrk="1" latinLnBrk="0" hangingPunct="1">
-              <a:spcBef>
-                <a:spcPct val="20000"/>
-              </a:spcBef>
-              <a:spcAft>
-                <a:spcPts val="600"/>
-              </a:spcAft>
-              <a:buClr>
-                <a:schemeClr val="accent1">
-                  <a:lumMod val="75000"/>
-                </a:schemeClr>
-              </a:buClr>
-              <a:buSzPct val="145000"/>
-              <a:buFont typeface="Arial"/>
-              <a:buChar char="•"/>
-              <a:defRPr sz="1400" kern="1200" cap="none">
-                <a:solidFill>
-                  <a:schemeClr val="tx1"/>
-                </a:solidFill>
-                <a:effectLst/>
-                <a:latin typeface="+mn-lt"/>
-                <a:ea typeface="+mn-ea"/>
-                <a:cs typeface="+mn-cs"/>
-              </a:defRPr>
-            </a:lvl5pPr>
-            <a:lvl6pPr marL="2514600" indent="-228600" algn="l" defTabSz="457200" rtl="0" eaLnBrk="1" latinLnBrk="0" hangingPunct="1">
-              <a:spcBef>
-                <a:spcPct val="20000"/>
-              </a:spcBef>
-              <a:spcAft>
-                <a:spcPts val="600"/>
-              </a:spcAft>
-              <a:buClr>
-                <a:schemeClr val="accent1">
-                  <a:lumMod val="75000"/>
-                </a:schemeClr>
-              </a:buClr>
-              <a:buSzPct val="145000"/>
-              <a:buFont typeface="Arial"/>
-              <a:buChar char="•"/>
-              <a:defRPr sz="1400" kern="1200" cap="none">
-                <a:solidFill>
-                  <a:schemeClr val="tx1"/>
-                </a:solidFill>
-                <a:effectLst/>
-                <a:latin typeface="+mn-lt"/>
-                <a:ea typeface="+mn-ea"/>
-                <a:cs typeface="+mn-cs"/>
-              </a:defRPr>
-            </a:lvl6pPr>
-            <a:lvl7pPr marL="2971800" indent="-228600" algn="l" defTabSz="457200" rtl="0" eaLnBrk="1" latinLnBrk="0" hangingPunct="1">
-              <a:spcBef>
-                <a:spcPct val="20000"/>
-              </a:spcBef>
-              <a:spcAft>
-                <a:spcPts val="600"/>
-              </a:spcAft>
-              <a:buClr>
-                <a:schemeClr val="accent1">
-                  <a:lumMod val="75000"/>
-                </a:schemeClr>
-              </a:buClr>
-              <a:buSzPct val="145000"/>
-              <a:buFont typeface="Arial"/>
-              <a:buChar char="•"/>
-              <a:defRPr sz="1400" kern="1200" cap="none">
-                <a:solidFill>
-                  <a:schemeClr val="tx1"/>
-                </a:solidFill>
-                <a:effectLst/>
-                <a:latin typeface="+mn-lt"/>
-                <a:ea typeface="+mn-ea"/>
-                <a:cs typeface="+mn-cs"/>
-              </a:defRPr>
-            </a:lvl7pPr>
-            <a:lvl8pPr marL="3429000" indent="-228600" algn="l" defTabSz="457200" rtl="0" eaLnBrk="1" latinLnBrk="0" hangingPunct="1">
-              <a:spcBef>
-                <a:spcPct val="20000"/>
-              </a:spcBef>
-              <a:spcAft>
-                <a:spcPts val="600"/>
-              </a:spcAft>
-              <a:buClr>
-                <a:schemeClr val="accent1">
-                  <a:lumMod val="75000"/>
-                </a:schemeClr>
-              </a:buClr>
-              <a:buSzPct val="145000"/>
-              <a:buFont typeface="Arial"/>
-              <a:buChar char="•"/>
-              <a:defRPr sz="1400" kern="1200" cap="none">
-                <a:solidFill>
-                  <a:schemeClr val="tx1"/>
-                </a:solidFill>
-                <a:effectLst/>
-                <a:latin typeface="+mn-lt"/>
-                <a:ea typeface="+mn-ea"/>
-                <a:cs typeface="+mn-cs"/>
-              </a:defRPr>
-            </a:lvl8pPr>
-            <a:lvl9pPr marL="3886200" indent="-228600" algn="l" defTabSz="457200" rtl="0" eaLnBrk="1" latinLnBrk="0" hangingPunct="1">
-              <a:spcBef>
-                <a:spcPct val="20000"/>
-              </a:spcBef>
-              <a:spcAft>
-                <a:spcPts val="600"/>
-              </a:spcAft>
-              <a:buClr>
-                <a:schemeClr val="accent1">
-                  <a:lumMod val="75000"/>
-                </a:schemeClr>
-              </a:buClr>
-              <a:buSzPct val="145000"/>
-              <a:buFont typeface="Arial"/>
-              <a:buChar char="•"/>
-              <a:defRPr sz="1400" kern="1200" cap="none">
-                <a:solidFill>
-                  <a:schemeClr val="tx1"/>
-                </a:solidFill>
-                <a:effectLst/>
-                <a:latin typeface="+mn-lt"/>
-                <a:ea typeface="+mn-ea"/>
-                <a:cs typeface="+mn-cs"/>
-              </a:defRPr>
-            </a:lvl9pPr>
-          </a:lstStyle>
-          <a:p>
-            <a:endParaRPr lang="en-IE" dirty="0"/>
-          </a:p>
-        </p:txBody>
-      </p:sp>
-    </p:spTree>
-    <p:extLst>
-      <p:ext uri="{BB962C8B-B14F-4D97-AF65-F5344CB8AC3E}">
-        <p14:creationId xmlns:p14="http://schemas.microsoft.com/office/powerpoint/2010/main" val="1690895107"/>
-      </p:ext>
-    </p:extLst>
-  </p:cSld>
-  <p:clrMapOvr>
-    <a:masterClrMapping/>
-  </p:clrMapOvr>
-</p:sld>
-</file>
-
-<file path=ppt/slides/slide8.xml><?xml version="1.0" encoding="utf-8"?>
-<p:sld xmlns:a="http://schemas.openxmlformats.org/drawingml/2006/main" xmlns:r="http://schemas.openxmlformats.org/officeDocument/2006/relationships" xmlns:p="http://schemas.openxmlformats.org/presentationml/2006/main">
-  <p:cSld>
-    <p:spTree>
-      <p:nvGrpSpPr>
-        <p:cNvPr id="1" name=""/>
-        <p:cNvGrpSpPr/>
-        <p:nvPr/>
-      </p:nvGrpSpPr>
-      <p:grpSpPr>
-        <a:xfrm>
-          <a:off x="0" y="0"/>
-          <a:ext cx="0" cy="0"/>
-          <a:chOff x="0" y="0"/>
-          <a:chExt cx="0" cy="0"/>
-        </a:xfrm>
-      </p:grpSpPr>
-      <p:sp>
-        <p:nvSpPr>
-          <p:cNvPr id="2" name="Title 1">
-            <a:extLst>
-              <a:ext uri="{FF2B5EF4-FFF2-40B4-BE49-F238E27FC236}">
-                <a16:creationId xmlns:a16="http://schemas.microsoft.com/office/drawing/2014/main" id="{4C90C167-08FA-464D-AED5-8BEEEE4998A2}"/>
-              </a:ext>
-            </a:extLst>
-          </p:cNvPr>
-          <p:cNvSpPr>
-            <a:spLocks noGrp="1"/>
-          </p:cNvSpPr>
-          <p:nvPr>
-            <p:ph type="title"/>
-          </p:nvPr>
-        </p:nvSpPr>
-        <p:spPr/>
-        <p:txBody>
-          <a:bodyPr/>
-          <a:lstStyle/>
-          <a:p>
-            <a:r>
-              <a:rPr lang="en-IE" dirty="0"/>
-              <a:t>Gestures</a:t>
-            </a:r>
-          </a:p>
-        </p:txBody>
-      </p:sp>
-      <p:sp>
-        <p:nvSpPr>
-          <p:cNvPr id="3" name="Content Placeholder 2">
-            <a:extLst>
-              <a:ext uri="{FF2B5EF4-FFF2-40B4-BE49-F238E27FC236}">
-                <a16:creationId xmlns:a16="http://schemas.microsoft.com/office/drawing/2014/main" id="{B554211A-3BDC-4763-AD55-8C5844C85348}"/>
-              </a:ext>
-            </a:extLst>
-          </p:cNvPr>
-          <p:cNvSpPr>
-            <a:spLocks noGrp="1"/>
-          </p:cNvSpPr>
-          <p:nvPr>
-            <p:ph idx="1"/>
-          </p:nvPr>
-        </p:nvSpPr>
-        <p:spPr>
-          <a:xfrm>
-            <a:off x="1740060" y="1749391"/>
-            <a:ext cx="9762963" cy="2408854"/>
-          </a:xfrm>
-        </p:spPr>
-        <p:txBody>
-          <a:bodyPr/>
-          <a:lstStyle/>
-          <a:p>
-            <a:r>
-              <a:rPr lang="en-IE" dirty="0"/>
-              <a:t>Fist to Shoot							Tap Finger to Recalibrate</a:t>
-            </a:r>
-          </a:p>
-          <a:p>
-            <a:pPr lvl="7"/>
-            <a:endParaRPr lang="en-IE" dirty="0"/>
-          </a:p>
-          <a:p>
-            <a:endParaRPr lang="en-IE" dirty="0"/>
-          </a:p>
-        </p:txBody>
-      </p:sp>
-      <p:pic>
-        <p:nvPicPr>
-          <p:cNvPr id="7" name="Picture 6">
-            <a:extLst>
-              <a:ext uri="{FF2B5EF4-FFF2-40B4-BE49-F238E27FC236}">
-                <a16:creationId xmlns:a16="http://schemas.microsoft.com/office/drawing/2014/main" id="{8A9A97CE-FED9-499E-883E-053DDD333FCC}"/>
-              </a:ext>
-            </a:extLst>
-          </p:cNvPr>
-          <p:cNvPicPr>
-            <a:picLocks noChangeAspect="1"/>
-          </p:cNvPicPr>
-          <p:nvPr/>
-        </p:nvPicPr>
-        <p:blipFill>
-          <a:blip r:embed="rId2">
-            <a:extLst>
-              <a:ext uri="{28A0092B-C50C-407E-A947-70E740481C1C}">
-                <a14:useLocalDpi xmlns:a14="http://schemas.microsoft.com/office/drawing/2010/main" val="0"/>
-              </a:ext>
-            </a:extLst>
-          </a:blip>
-          <a:stretch>
-            <a:fillRect/>
-          </a:stretch>
-        </p:blipFill>
-        <p:spPr>
-          <a:xfrm>
-            <a:off x="1902781" y="2953818"/>
-            <a:ext cx="2143125" cy="2143125"/>
-          </a:xfrm>
-          <a:prstGeom prst="rect">
-            <a:avLst/>
-          </a:prstGeom>
-        </p:spPr>
-      </p:pic>
-      <p:pic>
-        <p:nvPicPr>
-          <p:cNvPr id="11" name="Picture 10">
-            <a:extLst>
-              <a:ext uri="{FF2B5EF4-FFF2-40B4-BE49-F238E27FC236}">
-                <a16:creationId xmlns:a16="http://schemas.microsoft.com/office/drawing/2014/main" id="{5F1063C9-A184-44DD-9EB3-DF44AEC40736}"/>
-              </a:ext>
-            </a:extLst>
-          </p:cNvPr>
-          <p:cNvPicPr>
-            <a:picLocks noChangeAspect="1"/>
-          </p:cNvPicPr>
-          <p:nvPr/>
-        </p:nvPicPr>
-        <p:blipFill>
-          <a:blip r:embed="rId3">
-            <a:extLst>
-              <a:ext uri="{28A0092B-C50C-407E-A947-70E740481C1C}">
-                <a14:useLocalDpi xmlns:a14="http://schemas.microsoft.com/office/drawing/2010/main" val="0"/>
-              </a:ext>
-            </a:extLst>
-          </a:blip>
-          <a:stretch>
-            <a:fillRect/>
-          </a:stretch>
-        </p:blipFill>
-        <p:spPr>
-          <a:xfrm>
-            <a:off x="7272686" y="2953817"/>
-            <a:ext cx="2143125" cy="2143125"/>
-          </a:xfrm>
-          <a:prstGeom prst="rect">
-            <a:avLst/>
-          </a:prstGeom>
-        </p:spPr>
-      </p:pic>
-    </p:spTree>
-    <p:extLst>
-      <p:ext uri="{BB962C8B-B14F-4D97-AF65-F5344CB8AC3E}">
-        <p14:creationId xmlns:p14="http://schemas.microsoft.com/office/powerpoint/2010/main" val="3105002262"/>
-      </p:ext>
-    </p:extLst>
-  </p:cSld>
-  <p:clrMapOvr>
-    <a:masterClrMapping/>
-  </p:clrMapOvr>
-</p:sld>
-</file>
-
-<file path=ppt/slides/slide9.xml><?xml version="1.0" encoding="utf-8"?>
-<p:sld xmlns:a="http://schemas.openxmlformats.org/drawingml/2006/main" xmlns:r="http://schemas.openxmlformats.org/officeDocument/2006/relationships" xmlns:p="http://schemas.openxmlformats.org/presentationml/2006/main">
-  <p:cSld>
-    <p:spTree>
-      <p:nvGrpSpPr>
-        <p:cNvPr id="1" name=""/>
-        <p:cNvGrpSpPr/>
-        <p:nvPr/>
-      </p:nvGrpSpPr>
-      <p:grpSpPr>
-        <a:xfrm>
-          <a:off x="0" y="0"/>
-          <a:ext cx="0" cy="0"/>
-          <a:chOff x="0" y="0"/>
-          <a:chExt cx="0" cy="0"/>
-        </a:xfrm>
-      </p:grpSpPr>
-      <p:sp>
-        <p:nvSpPr>
-          <p:cNvPr id="2" name="Title 1">
-            <a:extLst>
-              <a:ext uri="{FF2B5EF4-FFF2-40B4-BE49-F238E27FC236}">
-                <a16:creationId xmlns:a16="http://schemas.microsoft.com/office/drawing/2014/main" id="{5AD437B4-3B77-4CE9-A163-D23ABB3DF25F}"/>
-              </a:ext>
-            </a:extLst>
-          </p:cNvPr>
-          <p:cNvSpPr>
-            <a:spLocks noGrp="1"/>
-          </p:cNvSpPr>
-          <p:nvPr>
-            <p:ph type="title"/>
-          </p:nvPr>
-        </p:nvSpPr>
-        <p:spPr/>
-        <p:txBody>
-          <a:bodyPr/>
-          <a:lstStyle/>
-          <a:p>
-            <a:r>
-              <a:rPr lang="en-IE" dirty="0"/>
-              <a:t>Why These Gestures?</a:t>
-            </a:r>
-          </a:p>
-        </p:txBody>
-      </p:sp>
-      <p:sp>
-        <p:nvSpPr>
-          <p:cNvPr id="3" name="Content Placeholder 2">
-            <a:extLst>
-              <a:ext uri="{FF2B5EF4-FFF2-40B4-BE49-F238E27FC236}">
-                <a16:creationId xmlns:a16="http://schemas.microsoft.com/office/drawing/2014/main" id="{4EECCFE7-C8A6-4BB6-B6D6-EA243E2DC7D7}"/>
-              </a:ext>
-            </a:extLst>
-          </p:cNvPr>
-          <p:cNvSpPr>
-            <a:spLocks noGrp="1"/>
-          </p:cNvSpPr>
-          <p:nvPr>
-            <p:ph idx="1"/>
-          </p:nvPr>
-        </p:nvSpPr>
-        <p:spPr>
-          <a:xfrm>
-            <a:off x="1279007" y="2817850"/>
-            <a:ext cx="10018713" cy="3124201"/>
-          </a:xfrm>
-        </p:spPr>
-        <p:txBody>
-          <a:bodyPr/>
-          <a:lstStyle/>
-          <a:p>
-            <a:r>
-              <a:rPr lang="en-IE" dirty="0"/>
-              <a:t>We decided on the arm movement gesture for aiming as it made the most sense. </a:t>
-            </a:r>
-          </a:p>
-          <a:p>
-            <a:r>
-              <a:rPr lang="en-IE" dirty="0"/>
-              <a:t>Tap fingers for recalibration – easy gesture</a:t>
-            </a:r>
-          </a:p>
-          <a:p>
-            <a:r>
-              <a:rPr lang="en-IE" dirty="0"/>
-              <a:t>Fist for shooting – closest gesture to pulling a trigger</a:t>
-            </a:r>
-          </a:p>
-          <a:p>
-            <a:endParaRPr lang="en-IE" dirty="0"/>
-          </a:p>
-        </p:txBody>
-      </p:sp>
-    </p:spTree>
-    <p:extLst>
-      <p:ext uri="{BB962C8B-B14F-4D97-AF65-F5344CB8AC3E}">
-        <p14:creationId xmlns:p14="http://schemas.microsoft.com/office/powerpoint/2010/main" val="741779318"/>
+        <p14:creationId xmlns:p14="http://schemas.microsoft.com/office/powerpoint/2010/main" val="3974251162"/>
       </p:ext>
     </p:extLst>
   </p:cSld>

</xml_diff>

<commit_message>
Fixed Canvas sizing issues - added to presentation
</commit_message>
<xml_diff>
--- a/Gesture Based UI Project.pptx
+++ b/Gesture Based UI Project.pptx
@@ -7,10 +7,11 @@
   <p:sldIdLst>
     <p:sldId id="256" r:id="rId2"/>
     <p:sldId id="257" r:id="rId3"/>
-    <p:sldId id="266" r:id="rId4"/>
-    <p:sldId id="267" r:id="rId5"/>
-    <p:sldId id="268" r:id="rId6"/>
-    <p:sldId id="269" r:id="rId7"/>
+    <p:sldId id="270" r:id="rId4"/>
+    <p:sldId id="266" r:id="rId5"/>
+    <p:sldId id="267" r:id="rId6"/>
+    <p:sldId id="268" r:id="rId7"/>
+    <p:sldId id="269" r:id="rId8"/>
   </p:sldIdLst>
   <p:sldSz cx="12192000" cy="6858000"/>
   <p:notesSz cx="6858000" cy="9144000"/>
@@ -6329,7 +6330,15 @@
           <a:p>
             <a:r>
               <a:rPr lang="en-IE" dirty="0"/>
-              <a:t>First Person Shooter </a:t>
+              <a:t>First Person Shooter through the use of a </a:t>
+            </a:r>
+            <a:r>
+              <a:rPr lang="en-IE" dirty="0" err="1"/>
+              <a:t>myo</a:t>
+            </a:r>
+            <a:r>
+              <a:rPr lang="en-IE" dirty="0"/>
+              <a:t> armband</a:t>
             </a:r>
           </a:p>
           <a:p>
@@ -6381,6 +6390,116 @@
           <p:cNvPr id="2" name="Title 1">
             <a:extLst>
               <a:ext uri="{FF2B5EF4-FFF2-40B4-BE49-F238E27FC236}">
+                <a16:creationId xmlns:a16="http://schemas.microsoft.com/office/drawing/2014/main" id="{D275F81D-626E-4438-B958-ACD13EABF9E7}"/>
+              </a:ext>
+            </a:extLst>
+          </p:cNvPr>
+          <p:cNvSpPr>
+            <a:spLocks noGrp="1"/>
+          </p:cNvSpPr>
+          <p:nvPr>
+            <p:ph type="title"/>
+          </p:nvPr>
+        </p:nvSpPr>
+        <p:spPr/>
+        <p:txBody>
+          <a:bodyPr/>
+          <a:lstStyle/>
+          <a:p>
+            <a:r>
+              <a:rPr lang="en-IE" dirty="0" err="1"/>
+              <a:t>Myo</a:t>
+            </a:r>
+            <a:r>
+              <a:rPr lang="en-IE" dirty="0"/>
+              <a:t> Armband</a:t>
+            </a:r>
+          </a:p>
+        </p:txBody>
+      </p:sp>
+      <p:sp>
+        <p:nvSpPr>
+          <p:cNvPr id="3" name="Content Placeholder 2">
+            <a:extLst>
+              <a:ext uri="{FF2B5EF4-FFF2-40B4-BE49-F238E27FC236}">
+                <a16:creationId xmlns:a16="http://schemas.microsoft.com/office/drawing/2014/main" id="{594446E6-01B7-42B6-AE2C-6A8F473D1561}"/>
+              </a:ext>
+            </a:extLst>
+          </p:cNvPr>
+          <p:cNvSpPr>
+            <a:spLocks noGrp="1"/>
+          </p:cNvSpPr>
+          <p:nvPr>
+            <p:ph idx="1"/>
+          </p:nvPr>
+        </p:nvSpPr>
+        <p:spPr/>
+        <p:txBody>
+          <a:bodyPr/>
+          <a:lstStyle/>
+          <a:p>
+            <a:r>
+              <a:rPr lang="en-IE" dirty="0"/>
+              <a:t>The </a:t>
+            </a:r>
+            <a:r>
+              <a:rPr lang="en-IE" dirty="0" err="1"/>
+              <a:t>Myo</a:t>
+            </a:r>
+            <a:r>
+              <a:rPr lang="en-IE" dirty="0"/>
+              <a:t> armband lets you use the electrical activity in your muscles to wirelessly control your computer</a:t>
+            </a:r>
+          </a:p>
+          <a:p>
+            <a:r>
+              <a:rPr lang="en-IE" dirty="0"/>
+              <a:t>These can be read through gestures</a:t>
+            </a:r>
+          </a:p>
+          <a:p>
+            <a:r>
+              <a:rPr lang="en-IE" dirty="0"/>
+              <a:t>Connects to a USB through Bluetooth</a:t>
+            </a:r>
+          </a:p>
+        </p:txBody>
+      </p:sp>
+    </p:spTree>
+    <p:extLst>
+      <p:ext uri="{BB962C8B-B14F-4D97-AF65-F5344CB8AC3E}">
+        <p14:creationId xmlns:p14="http://schemas.microsoft.com/office/powerpoint/2010/main" val="3411253187"/>
+      </p:ext>
+    </p:extLst>
+  </p:cSld>
+  <p:clrMapOvr>
+    <a:masterClrMapping/>
+  </p:clrMapOvr>
+</p:sld>
+</file>
+
+<file path=ppt/slides/slide4.xml><?xml version="1.0" encoding="utf-8"?>
+<p:sld xmlns:a="http://schemas.openxmlformats.org/drawingml/2006/main" xmlns:r="http://schemas.openxmlformats.org/officeDocument/2006/relationships" xmlns:p="http://schemas.openxmlformats.org/presentationml/2006/main">
+  <p:cSld>
+    <p:spTree>
+      <p:nvGrpSpPr>
+        <p:cNvPr id="1" name=""/>
+        <p:cNvGrpSpPr/>
+        <p:nvPr/>
+      </p:nvGrpSpPr>
+      <p:grpSpPr>
+        <a:xfrm>
+          <a:off x="0" y="0"/>
+          <a:ext cx="0" cy="0"/>
+          <a:chOff x="0" y="0"/>
+          <a:chExt cx="0" cy="0"/>
+        </a:xfrm>
+      </p:grpSpPr>
+      <p:sp>
+        <p:nvSpPr>
+          <p:cNvPr id="2" name="Title 1">
+            <a:extLst>
+              <a:ext uri="{FF2B5EF4-FFF2-40B4-BE49-F238E27FC236}">
                 <a16:creationId xmlns:a16="http://schemas.microsoft.com/office/drawing/2014/main" id="{2F91B12C-ABDD-4383-BA60-7C2FFFF522EE}"/>
               </a:ext>
             </a:extLst>
@@ -6468,7 +6587,7 @@
 </p:sld>
 </file>
 
-<file path=ppt/slides/slide4.xml><?xml version="1.0" encoding="utf-8"?>
+<file path=ppt/slides/slide5.xml><?xml version="1.0" encoding="utf-8"?>
 <p:sld xmlns:a="http://schemas.openxmlformats.org/drawingml/2006/main" xmlns:r="http://schemas.openxmlformats.org/officeDocument/2006/relationships" xmlns:p="http://schemas.openxmlformats.org/presentationml/2006/main">
   <p:cSld>
     <p:spTree>
@@ -6864,7 +6983,7 @@
 </p:sld>
 </file>
 
-<file path=ppt/slides/slide5.xml><?xml version="1.0" encoding="utf-8"?>
+<file path=ppt/slides/slide6.xml><?xml version="1.0" encoding="utf-8"?>
 <p:sld xmlns:a="http://schemas.openxmlformats.org/drawingml/2006/main" xmlns:r="http://schemas.openxmlformats.org/officeDocument/2006/relationships" xmlns:p="http://schemas.openxmlformats.org/presentationml/2006/main">
   <p:cSld>
     <p:spTree>
@@ -6996,7 +7115,7 @@
 </p:sld>
 </file>
 
-<file path=ppt/slides/slide6.xml><?xml version="1.0" encoding="utf-8"?>
+<file path=ppt/slides/slide7.xml><?xml version="1.0" encoding="utf-8"?>
 <p:sld xmlns:a="http://schemas.openxmlformats.org/drawingml/2006/main" xmlns:r="http://schemas.openxmlformats.org/officeDocument/2006/relationships" xmlns:p="http://schemas.openxmlformats.org/presentationml/2006/main">
   <p:cSld>
     <p:spTree>

</xml_diff>

<commit_message>
Presentation changes - readded PoseCheck code
</commit_message>
<xml_diff>
--- a/Gesture Based UI Project.pptx
+++ b/Gesture Based UI Project.pptx
@@ -8,10 +8,13 @@
     <p:sldId id="256" r:id="rId2"/>
     <p:sldId id="257" r:id="rId3"/>
     <p:sldId id="270" r:id="rId4"/>
-    <p:sldId id="266" r:id="rId5"/>
-    <p:sldId id="267" r:id="rId6"/>
-    <p:sldId id="268" r:id="rId7"/>
-    <p:sldId id="269" r:id="rId8"/>
+    <p:sldId id="271" r:id="rId5"/>
+    <p:sldId id="272" r:id="rId6"/>
+    <p:sldId id="266" r:id="rId7"/>
+    <p:sldId id="267" r:id="rId8"/>
+    <p:sldId id="268" r:id="rId9"/>
+    <p:sldId id="269" r:id="rId10"/>
+    <p:sldId id="273" r:id="rId11"/>
   </p:sldIdLst>
   <p:sldSz cx="12192000" cy="6858000"/>
   <p:notesSz cx="6858000" cy="9144000"/>
@@ -620,7 +623,7 @@
           <a:p>
             <a:fld id="{6332FE72-1E95-463A-95D4-9DD1E29E749E}" type="datetimeFigureOut">
               <a:rPr lang="en-IE" smtClean="0"/>
-              <a:t>04/04/2019</a:t>
+              <a:t>05/04/2019</a:t>
             </a:fld>
             <a:endParaRPr lang="en-IE"/>
           </a:p>
@@ -916,7 +919,7 @@
           <a:p>
             <a:fld id="{6332FE72-1E95-463A-95D4-9DD1E29E749E}" type="datetimeFigureOut">
               <a:rPr lang="en-IE" smtClean="0"/>
-              <a:t>04/04/2019</a:t>
+              <a:t>05/04/2019</a:t>
             </a:fld>
             <a:endParaRPr lang="en-IE"/>
           </a:p>
@@ -1164,7 +1167,7 @@
           <a:p>
             <a:fld id="{6332FE72-1E95-463A-95D4-9DD1E29E749E}" type="datetimeFigureOut">
               <a:rPr lang="en-IE" smtClean="0"/>
-              <a:t>04/04/2019</a:t>
+              <a:t>05/04/2019</a:t>
             </a:fld>
             <a:endParaRPr lang="en-IE"/>
           </a:p>
@@ -1704,7 +1707,7 @@
           <a:p>
             <a:fld id="{6332FE72-1E95-463A-95D4-9DD1E29E749E}" type="datetimeFigureOut">
               <a:rPr lang="en-IE" smtClean="0"/>
-              <a:t>04/04/2019</a:t>
+              <a:t>05/04/2019</a:t>
             </a:fld>
             <a:endParaRPr lang="en-IE"/>
           </a:p>
@@ -1952,7 +1955,7 @@
           <a:p>
             <a:fld id="{6332FE72-1E95-463A-95D4-9DD1E29E749E}" type="datetimeFigureOut">
               <a:rPr lang="en-IE" smtClean="0"/>
-              <a:t>04/04/2019</a:t>
+              <a:t>05/04/2019</a:t>
             </a:fld>
             <a:endParaRPr lang="en-IE"/>
           </a:p>
@@ -2484,7 +2487,7 @@
           <a:p>
             <a:fld id="{6332FE72-1E95-463A-95D4-9DD1E29E749E}" type="datetimeFigureOut">
               <a:rPr lang="en-IE" smtClean="0"/>
-              <a:t>04/04/2019</a:t>
+              <a:t>05/04/2019</a:t>
             </a:fld>
             <a:endParaRPr lang="en-IE"/>
           </a:p>
@@ -2781,7 +2784,7 @@
           <a:p>
             <a:fld id="{6332FE72-1E95-463A-95D4-9DD1E29E749E}" type="datetimeFigureOut">
               <a:rPr lang="en-IE" smtClean="0"/>
-              <a:t>04/04/2019</a:t>
+              <a:t>05/04/2019</a:t>
             </a:fld>
             <a:endParaRPr lang="en-IE"/>
           </a:p>
@@ -2955,7 +2958,7 @@
           <a:p>
             <a:fld id="{6332FE72-1E95-463A-95D4-9DD1E29E749E}" type="datetimeFigureOut">
               <a:rPr lang="en-IE" smtClean="0"/>
-              <a:t>04/04/2019</a:t>
+              <a:t>05/04/2019</a:t>
             </a:fld>
             <a:endParaRPr lang="en-IE"/>
           </a:p>
@@ -3135,7 +3138,7 @@
           <a:p>
             <a:fld id="{6332FE72-1E95-463A-95D4-9DD1E29E749E}" type="datetimeFigureOut">
               <a:rPr lang="en-IE" smtClean="0"/>
-              <a:t>04/04/2019</a:t>
+              <a:t>05/04/2019</a:t>
             </a:fld>
             <a:endParaRPr lang="en-IE"/>
           </a:p>
@@ -3305,7 +3308,7 @@
           <a:p>
             <a:fld id="{6332FE72-1E95-463A-95D4-9DD1E29E749E}" type="datetimeFigureOut">
               <a:rPr lang="en-IE" smtClean="0"/>
-              <a:t>04/04/2019</a:t>
+              <a:t>05/04/2019</a:t>
             </a:fld>
             <a:endParaRPr lang="en-IE"/>
           </a:p>
@@ -3556,7 +3559,7 @@
           <a:p>
             <a:fld id="{6332FE72-1E95-463A-95D4-9DD1E29E749E}" type="datetimeFigureOut">
               <a:rPr lang="en-IE" smtClean="0"/>
-              <a:t>04/04/2019</a:t>
+              <a:t>05/04/2019</a:t>
             </a:fld>
             <a:endParaRPr lang="en-IE"/>
           </a:p>
@@ -3853,7 +3856,7 @@
           <a:p>
             <a:fld id="{6332FE72-1E95-463A-95D4-9DD1E29E749E}" type="datetimeFigureOut">
               <a:rPr lang="en-IE" smtClean="0"/>
-              <a:t>04/04/2019</a:t>
+              <a:t>05/04/2019</a:t>
             </a:fld>
             <a:endParaRPr lang="en-IE"/>
           </a:p>
@@ -4295,7 +4298,7 @@
           <a:p>
             <a:fld id="{6332FE72-1E95-463A-95D4-9DD1E29E749E}" type="datetimeFigureOut">
               <a:rPr lang="en-IE" smtClean="0"/>
-              <a:t>04/04/2019</a:t>
+              <a:t>05/04/2019</a:t>
             </a:fld>
             <a:endParaRPr lang="en-IE"/>
           </a:p>
@@ -4413,7 +4416,7 @@
           <a:p>
             <a:fld id="{6332FE72-1E95-463A-95D4-9DD1E29E749E}" type="datetimeFigureOut">
               <a:rPr lang="en-IE" smtClean="0"/>
-              <a:t>04/04/2019</a:t>
+              <a:t>05/04/2019</a:t>
             </a:fld>
             <a:endParaRPr lang="en-IE"/>
           </a:p>
@@ -4508,7 +4511,7 @@
           <a:p>
             <a:fld id="{6332FE72-1E95-463A-95D4-9DD1E29E749E}" type="datetimeFigureOut">
               <a:rPr lang="en-IE" smtClean="0"/>
-              <a:t>04/04/2019</a:t>
+              <a:t>05/04/2019</a:t>
             </a:fld>
             <a:endParaRPr lang="en-IE"/>
           </a:p>
@@ -4791,7 +4794,7 @@
           <a:p>
             <a:fld id="{6332FE72-1E95-463A-95D4-9DD1E29E749E}" type="datetimeFigureOut">
               <a:rPr lang="en-IE" smtClean="0"/>
-              <a:t>04/04/2019</a:t>
+              <a:t>05/04/2019</a:t>
             </a:fld>
             <a:endParaRPr lang="en-IE"/>
           </a:p>
@@ -5082,7 +5085,7 @@
           <a:p>
             <a:fld id="{6332FE72-1E95-463A-95D4-9DD1E29E749E}" type="datetimeFigureOut">
               <a:rPr lang="en-IE" smtClean="0"/>
-              <a:t>04/04/2019</a:t>
+              <a:t>05/04/2019</a:t>
             </a:fld>
             <a:endParaRPr lang="en-IE"/>
           </a:p>
@@ -5612,7 +5615,7 @@
           <a:p>
             <a:fld id="{6332FE72-1E95-463A-95D4-9DD1E29E749E}" type="datetimeFigureOut">
               <a:rPr lang="en-IE" smtClean="0"/>
-              <a:t>04/04/2019</a:t>
+              <a:t>05/04/2019</a:t>
             </a:fld>
             <a:endParaRPr lang="en-IE"/>
           </a:p>
@@ -6212,6 +6215,89 @@
 </p:sld>
 </file>
 
+<file path=ppt/slides/slide10.xml><?xml version="1.0" encoding="utf-8"?>
+<p:sld xmlns:a="http://schemas.openxmlformats.org/drawingml/2006/main" xmlns:r="http://schemas.openxmlformats.org/officeDocument/2006/relationships" xmlns:p="http://schemas.openxmlformats.org/presentationml/2006/main">
+  <p:cSld>
+    <p:spTree>
+      <p:nvGrpSpPr>
+        <p:cNvPr id="1" name=""/>
+        <p:cNvGrpSpPr/>
+        <p:nvPr/>
+      </p:nvGrpSpPr>
+      <p:grpSpPr>
+        <a:xfrm>
+          <a:off x="0" y="0"/>
+          <a:ext cx="0" cy="0"/>
+          <a:chOff x="0" y="0"/>
+          <a:chExt cx="0" cy="0"/>
+        </a:xfrm>
+      </p:grpSpPr>
+      <p:sp>
+        <p:nvSpPr>
+          <p:cNvPr id="2" name="Title 1">
+            <a:extLst>
+              <a:ext uri="{FF2B5EF4-FFF2-40B4-BE49-F238E27FC236}">
+                <a16:creationId xmlns:a16="http://schemas.microsoft.com/office/drawing/2014/main" id="{71799FEC-41C0-40A2-8FFC-BCC0FD7A06A0}"/>
+              </a:ext>
+            </a:extLst>
+          </p:cNvPr>
+          <p:cNvSpPr>
+            <a:spLocks noGrp="1"/>
+          </p:cNvSpPr>
+          <p:nvPr>
+            <p:ph type="title"/>
+          </p:nvPr>
+        </p:nvSpPr>
+        <p:spPr/>
+        <p:txBody>
+          <a:bodyPr/>
+          <a:lstStyle/>
+          <a:p>
+            <a:r>
+              <a:rPr lang="en-IE" dirty="0"/>
+              <a:t>Demonstration </a:t>
+            </a:r>
+          </a:p>
+        </p:txBody>
+      </p:sp>
+      <p:sp>
+        <p:nvSpPr>
+          <p:cNvPr id="3" name="Content Placeholder 2">
+            <a:extLst>
+              <a:ext uri="{FF2B5EF4-FFF2-40B4-BE49-F238E27FC236}">
+                <a16:creationId xmlns:a16="http://schemas.microsoft.com/office/drawing/2014/main" id="{229C5BB0-D3BA-45CD-A3D1-060D01E375E4}"/>
+              </a:ext>
+            </a:extLst>
+          </p:cNvPr>
+          <p:cNvSpPr>
+            <a:spLocks noGrp="1"/>
+          </p:cNvSpPr>
+          <p:nvPr>
+            <p:ph idx="1"/>
+          </p:nvPr>
+        </p:nvSpPr>
+        <p:spPr/>
+        <p:txBody>
+          <a:bodyPr/>
+          <a:lstStyle/>
+          <a:p>
+            <a:endParaRPr lang="en-IE"/>
+          </a:p>
+        </p:txBody>
+      </p:sp>
+    </p:spTree>
+    <p:extLst>
+      <p:ext uri="{BB962C8B-B14F-4D97-AF65-F5344CB8AC3E}">
+        <p14:creationId xmlns:p14="http://schemas.microsoft.com/office/powerpoint/2010/main" val="4289040422"/>
+      </p:ext>
+    </p:extLst>
+  </p:cSld>
+  <p:clrMapOvr>
+    <a:masterClrMapping/>
+  </p:clrMapOvr>
+</p:sld>
+</file>
+
 <file path=ppt/slides/slide2.xml><?xml version="1.0" encoding="utf-8"?>
 <p:sld xmlns:a="http://schemas.openxmlformats.org/drawingml/2006/main" xmlns:r="http://schemas.openxmlformats.org/officeDocument/2006/relationships" xmlns:p="http://schemas.openxmlformats.org/presentationml/2006/main">
   <p:cSld>
@@ -6500,6 +6586,227 @@
           <p:cNvPr id="2" name="Title 1">
             <a:extLst>
               <a:ext uri="{FF2B5EF4-FFF2-40B4-BE49-F238E27FC236}">
+                <a16:creationId xmlns:a16="http://schemas.microsoft.com/office/drawing/2014/main" id="{E068FA19-7368-4F1C-B977-5740D836EF19}"/>
+              </a:ext>
+            </a:extLst>
+          </p:cNvPr>
+          <p:cNvSpPr>
+            <a:spLocks noGrp="1"/>
+          </p:cNvSpPr>
+          <p:nvPr>
+            <p:ph type="title"/>
+          </p:nvPr>
+        </p:nvSpPr>
+        <p:spPr/>
+        <p:txBody>
+          <a:bodyPr/>
+          <a:lstStyle/>
+          <a:p>
+            <a:r>
+              <a:rPr lang="en-IE" dirty="0"/>
+              <a:t>Planning / Development</a:t>
+            </a:r>
+          </a:p>
+        </p:txBody>
+      </p:sp>
+      <p:sp>
+        <p:nvSpPr>
+          <p:cNvPr id="3" name="Content Placeholder 2">
+            <a:extLst>
+              <a:ext uri="{FF2B5EF4-FFF2-40B4-BE49-F238E27FC236}">
+                <a16:creationId xmlns:a16="http://schemas.microsoft.com/office/drawing/2014/main" id="{AA8AE8DE-F1D2-416E-9405-7D9D5AB8CE22}"/>
+              </a:ext>
+            </a:extLst>
+          </p:cNvPr>
+          <p:cNvSpPr>
+            <a:spLocks noGrp="1"/>
+          </p:cNvSpPr>
+          <p:nvPr>
+            <p:ph idx="1"/>
+          </p:nvPr>
+        </p:nvSpPr>
+        <p:spPr/>
+        <p:txBody>
+          <a:bodyPr/>
+          <a:lstStyle/>
+          <a:p>
+            <a:r>
+              <a:rPr lang="en-IE" dirty="0"/>
+              <a:t>Wanted to make something in unity with </a:t>
+            </a:r>
+            <a:r>
+              <a:rPr lang="en-IE" dirty="0" err="1"/>
+              <a:t>Myo</a:t>
+            </a:r>
+            <a:r>
+              <a:rPr lang="en-IE" dirty="0"/>
+              <a:t> armband</a:t>
+            </a:r>
+          </a:p>
+          <a:p>
+            <a:r>
+              <a:rPr lang="en-IE" dirty="0"/>
+              <a:t>Had a few ideas – Golf, </a:t>
+            </a:r>
+            <a:r>
+              <a:rPr lang="en-IE" dirty="0" err="1"/>
+              <a:t>Monkeyball</a:t>
+            </a:r>
+            <a:r>
+              <a:rPr lang="en-IE" dirty="0"/>
+              <a:t> type game, Shooter</a:t>
+            </a:r>
+          </a:p>
+          <a:p>
+            <a:r>
+              <a:rPr lang="en-IE" dirty="0"/>
+              <a:t>Went with a shooter</a:t>
+            </a:r>
+          </a:p>
+        </p:txBody>
+      </p:sp>
+    </p:spTree>
+    <p:extLst>
+      <p:ext uri="{BB962C8B-B14F-4D97-AF65-F5344CB8AC3E}">
+        <p14:creationId xmlns:p14="http://schemas.microsoft.com/office/powerpoint/2010/main" val="2002091613"/>
+      </p:ext>
+    </p:extLst>
+  </p:cSld>
+  <p:clrMapOvr>
+    <a:masterClrMapping/>
+  </p:clrMapOvr>
+</p:sld>
+</file>
+
+<file path=ppt/slides/slide5.xml><?xml version="1.0" encoding="utf-8"?>
+<p:sld xmlns:a="http://schemas.openxmlformats.org/drawingml/2006/main" xmlns:r="http://schemas.openxmlformats.org/officeDocument/2006/relationships" xmlns:p="http://schemas.openxmlformats.org/presentationml/2006/main">
+  <p:cSld>
+    <p:spTree>
+      <p:nvGrpSpPr>
+        <p:cNvPr id="1" name=""/>
+        <p:cNvGrpSpPr/>
+        <p:nvPr/>
+      </p:nvGrpSpPr>
+      <p:grpSpPr>
+        <a:xfrm>
+          <a:off x="0" y="0"/>
+          <a:ext cx="0" cy="0"/>
+          <a:chOff x="0" y="0"/>
+          <a:chExt cx="0" cy="0"/>
+        </a:xfrm>
+      </p:grpSpPr>
+      <p:sp>
+        <p:nvSpPr>
+          <p:cNvPr id="2" name="Title 1">
+            <a:extLst>
+              <a:ext uri="{FF2B5EF4-FFF2-40B4-BE49-F238E27FC236}">
+                <a16:creationId xmlns:a16="http://schemas.microsoft.com/office/drawing/2014/main" id="{AFE62834-63E3-4D08-9CA9-D489D949135B}"/>
+              </a:ext>
+            </a:extLst>
+          </p:cNvPr>
+          <p:cNvSpPr>
+            <a:spLocks noGrp="1"/>
+          </p:cNvSpPr>
+          <p:nvPr>
+            <p:ph type="title"/>
+          </p:nvPr>
+        </p:nvSpPr>
+        <p:spPr/>
+        <p:txBody>
+          <a:bodyPr/>
+          <a:lstStyle/>
+          <a:p>
+            <a:r>
+              <a:rPr lang="en-IE" dirty="0"/>
+              <a:t>Planning / Development</a:t>
+            </a:r>
+          </a:p>
+        </p:txBody>
+      </p:sp>
+      <p:sp>
+        <p:nvSpPr>
+          <p:cNvPr id="3" name="Content Placeholder 2">
+            <a:extLst>
+              <a:ext uri="{FF2B5EF4-FFF2-40B4-BE49-F238E27FC236}">
+                <a16:creationId xmlns:a16="http://schemas.microsoft.com/office/drawing/2014/main" id="{8DA8A1B7-BEDA-4B2C-8303-0B4C5E32879A}"/>
+              </a:ext>
+            </a:extLst>
+          </p:cNvPr>
+          <p:cNvSpPr>
+            <a:spLocks noGrp="1"/>
+          </p:cNvSpPr>
+          <p:nvPr>
+            <p:ph idx="1"/>
+          </p:nvPr>
+        </p:nvSpPr>
+        <p:spPr/>
+        <p:txBody>
+          <a:bodyPr/>
+          <a:lstStyle/>
+          <a:p>
+            <a:r>
+              <a:rPr lang="en-IE" dirty="0"/>
+              <a:t>Initially developed the game with keyboard and mouse controls</a:t>
+            </a:r>
+          </a:p>
+          <a:p>
+            <a:r>
+              <a:rPr lang="en-IE" dirty="0"/>
+              <a:t>Converted to </a:t>
+            </a:r>
+            <a:r>
+              <a:rPr lang="en-IE" dirty="0" err="1"/>
+              <a:t>Myo</a:t>
+            </a:r>
+            <a:r>
+              <a:rPr lang="en-IE" dirty="0"/>
+              <a:t> when it was working and the band </a:t>
+            </a:r>
+            <a:r>
+              <a:rPr lang="en-IE"/>
+              <a:t>was available</a:t>
+            </a:r>
+          </a:p>
+          <a:p>
+            <a:endParaRPr lang="en-IE"/>
+          </a:p>
+        </p:txBody>
+      </p:sp>
+    </p:spTree>
+    <p:extLst>
+      <p:ext uri="{BB962C8B-B14F-4D97-AF65-F5344CB8AC3E}">
+        <p14:creationId xmlns:p14="http://schemas.microsoft.com/office/powerpoint/2010/main" val="2567987600"/>
+      </p:ext>
+    </p:extLst>
+  </p:cSld>
+  <p:clrMapOvr>
+    <a:masterClrMapping/>
+  </p:clrMapOvr>
+</p:sld>
+</file>
+
+<file path=ppt/slides/slide6.xml><?xml version="1.0" encoding="utf-8"?>
+<p:sld xmlns:a="http://schemas.openxmlformats.org/drawingml/2006/main" xmlns:r="http://schemas.openxmlformats.org/officeDocument/2006/relationships" xmlns:p="http://schemas.openxmlformats.org/presentationml/2006/main">
+  <p:cSld>
+    <p:spTree>
+      <p:nvGrpSpPr>
+        <p:cNvPr id="1" name=""/>
+        <p:cNvGrpSpPr/>
+        <p:nvPr/>
+      </p:nvGrpSpPr>
+      <p:grpSpPr>
+        <a:xfrm>
+          <a:off x="0" y="0"/>
+          <a:ext cx="0" cy="0"/>
+          <a:chOff x="0" y="0"/>
+          <a:chExt cx="0" cy="0"/>
+        </a:xfrm>
+      </p:grpSpPr>
+      <p:sp>
+        <p:nvSpPr>
+          <p:cNvPr id="2" name="Title 1">
+            <a:extLst>
+              <a:ext uri="{FF2B5EF4-FFF2-40B4-BE49-F238E27FC236}">
                 <a16:creationId xmlns:a16="http://schemas.microsoft.com/office/drawing/2014/main" id="{2F91B12C-ABDD-4383-BA60-7C2FFFF522EE}"/>
               </a:ext>
             </a:extLst>
@@ -6587,7 +6894,7 @@
 </p:sld>
 </file>
 
-<file path=ppt/slides/slide5.xml><?xml version="1.0" encoding="utf-8"?>
+<file path=ppt/slides/slide7.xml><?xml version="1.0" encoding="utf-8"?>
 <p:sld xmlns:a="http://schemas.openxmlformats.org/drawingml/2006/main" xmlns:r="http://schemas.openxmlformats.org/officeDocument/2006/relationships" xmlns:p="http://schemas.openxmlformats.org/presentationml/2006/main">
   <p:cSld>
     <p:spTree>
@@ -6983,7 +7290,7 @@
 </p:sld>
 </file>
 
-<file path=ppt/slides/slide6.xml><?xml version="1.0" encoding="utf-8"?>
+<file path=ppt/slides/slide8.xml><?xml version="1.0" encoding="utf-8"?>
 <p:sld xmlns:a="http://schemas.openxmlformats.org/drawingml/2006/main" xmlns:r="http://schemas.openxmlformats.org/officeDocument/2006/relationships" xmlns:p="http://schemas.openxmlformats.org/presentationml/2006/main">
   <p:cSld>
     <p:spTree>
@@ -7115,7 +7422,7 @@
 </p:sld>
 </file>
 
-<file path=ppt/slides/slide7.xml><?xml version="1.0" encoding="utf-8"?>
+<file path=ppt/slides/slide9.xml><?xml version="1.0" encoding="utf-8"?>
 <p:sld xmlns:a="http://schemas.openxmlformats.org/drawingml/2006/main" xmlns:r="http://schemas.openxmlformats.org/officeDocument/2006/relationships" xmlns:p="http://schemas.openxmlformats.org/presentationml/2006/main">
   <p:cSld>
     <p:spTree>

</xml_diff>

<commit_message>
Added Levels 2 and 3 - Button for calibration, logic needed
</commit_message>
<xml_diff>
--- a/Gesture Based UI Project.pptx
+++ b/Gesture Based UI Project.pptx
@@ -15,6 +15,7 @@
     <p:sldId id="268" r:id="rId9"/>
     <p:sldId id="269" r:id="rId10"/>
     <p:sldId id="273" r:id="rId11"/>
+    <p:sldId id="275" r:id="rId12"/>
   </p:sldIdLst>
   <p:sldSz cx="12192000" cy="6858000"/>
   <p:notesSz cx="6858000" cy="9144000"/>
@@ -623,7 +624,7 @@
           <a:p>
             <a:fld id="{6332FE72-1E95-463A-95D4-9DD1E29E749E}" type="datetimeFigureOut">
               <a:rPr lang="en-IE" smtClean="0"/>
-              <a:t>05/04/2019</a:t>
+              <a:t>07/04/2019</a:t>
             </a:fld>
             <a:endParaRPr lang="en-IE"/>
           </a:p>
@@ -919,7 +920,7 @@
           <a:p>
             <a:fld id="{6332FE72-1E95-463A-95D4-9DD1E29E749E}" type="datetimeFigureOut">
               <a:rPr lang="en-IE" smtClean="0"/>
-              <a:t>05/04/2019</a:t>
+              <a:t>07/04/2019</a:t>
             </a:fld>
             <a:endParaRPr lang="en-IE"/>
           </a:p>
@@ -1167,7 +1168,7 @@
           <a:p>
             <a:fld id="{6332FE72-1E95-463A-95D4-9DD1E29E749E}" type="datetimeFigureOut">
               <a:rPr lang="en-IE" smtClean="0"/>
-              <a:t>05/04/2019</a:t>
+              <a:t>07/04/2019</a:t>
             </a:fld>
             <a:endParaRPr lang="en-IE"/>
           </a:p>
@@ -1707,7 +1708,7 @@
           <a:p>
             <a:fld id="{6332FE72-1E95-463A-95D4-9DD1E29E749E}" type="datetimeFigureOut">
               <a:rPr lang="en-IE" smtClean="0"/>
-              <a:t>05/04/2019</a:t>
+              <a:t>07/04/2019</a:t>
             </a:fld>
             <a:endParaRPr lang="en-IE"/>
           </a:p>
@@ -1955,7 +1956,7 @@
           <a:p>
             <a:fld id="{6332FE72-1E95-463A-95D4-9DD1E29E749E}" type="datetimeFigureOut">
               <a:rPr lang="en-IE" smtClean="0"/>
-              <a:t>05/04/2019</a:t>
+              <a:t>07/04/2019</a:t>
             </a:fld>
             <a:endParaRPr lang="en-IE"/>
           </a:p>
@@ -2487,7 +2488,7 @@
           <a:p>
             <a:fld id="{6332FE72-1E95-463A-95D4-9DD1E29E749E}" type="datetimeFigureOut">
               <a:rPr lang="en-IE" smtClean="0"/>
-              <a:t>05/04/2019</a:t>
+              <a:t>07/04/2019</a:t>
             </a:fld>
             <a:endParaRPr lang="en-IE"/>
           </a:p>
@@ -2784,7 +2785,7 @@
           <a:p>
             <a:fld id="{6332FE72-1E95-463A-95D4-9DD1E29E749E}" type="datetimeFigureOut">
               <a:rPr lang="en-IE" smtClean="0"/>
-              <a:t>05/04/2019</a:t>
+              <a:t>07/04/2019</a:t>
             </a:fld>
             <a:endParaRPr lang="en-IE"/>
           </a:p>
@@ -2958,7 +2959,7 @@
           <a:p>
             <a:fld id="{6332FE72-1E95-463A-95D4-9DD1E29E749E}" type="datetimeFigureOut">
               <a:rPr lang="en-IE" smtClean="0"/>
-              <a:t>05/04/2019</a:t>
+              <a:t>07/04/2019</a:t>
             </a:fld>
             <a:endParaRPr lang="en-IE"/>
           </a:p>
@@ -3138,7 +3139,7 @@
           <a:p>
             <a:fld id="{6332FE72-1E95-463A-95D4-9DD1E29E749E}" type="datetimeFigureOut">
               <a:rPr lang="en-IE" smtClean="0"/>
-              <a:t>05/04/2019</a:t>
+              <a:t>07/04/2019</a:t>
             </a:fld>
             <a:endParaRPr lang="en-IE"/>
           </a:p>
@@ -3308,7 +3309,7 @@
           <a:p>
             <a:fld id="{6332FE72-1E95-463A-95D4-9DD1E29E749E}" type="datetimeFigureOut">
               <a:rPr lang="en-IE" smtClean="0"/>
-              <a:t>05/04/2019</a:t>
+              <a:t>07/04/2019</a:t>
             </a:fld>
             <a:endParaRPr lang="en-IE"/>
           </a:p>
@@ -3559,7 +3560,7 @@
           <a:p>
             <a:fld id="{6332FE72-1E95-463A-95D4-9DD1E29E749E}" type="datetimeFigureOut">
               <a:rPr lang="en-IE" smtClean="0"/>
-              <a:t>05/04/2019</a:t>
+              <a:t>07/04/2019</a:t>
             </a:fld>
             <a:endParaRPr lang="en-IE"/>
           </a:p>
@@ -3856,7 +3857,7 @@
           <a:p>
             <a:fld id="{6332FE72-1E95-463A-95D4-9DD1E29E749E}" type="datetimeFigureOut">
               <a:rPr lang="en-IE" smtClean="0"/>
-              <a:t>05/04/2019</a:t>
+              <a:t>07/04/2019</a:t>
             </a:fld>
             <a:endParaRPr lang="en-IE"/>
           </a:p>
@@ -4298,7 +4299,7 @@
           <a:p>
             <a:fld id="{6332FE72-1E95-463A-95D4-9DD1E29E749E}" type="datetimeFigureOut">
               <a:rPr lang="en-IE" smtClean="0"/>
-              <a:t>05/04/2019</a:t>
+              <a:t>07/04/2019</a:t>
             </a:fld>
             <a:endParaRPr lang="en-IE"/>
           </a:p>
@@ -4416,7 +4417,7 @@
           <a:p>
             <a:fld id="{6332FE72-1E95-463A-95D4-9DD1E29E749E}" type="datetimeFigureOut">
               <a:rPr lang="en-IE" smtClean="0"/>
-              <a:t>05/04/2019</a:t>
+              <a:t>07/04/2019</a:t>
             </a:fld>
             <a:endParaRPr lang="en-IE"/>
           </a:p>
@@ -4511,7 +4512,7 @@
           <a:p>
             <a:fld id="{6332FE72-1E95-463A-95D4-9DD1E29E749E}" type="datetimeFigureOut">
               <a:rPr lang="en-IE" smtClean="0"/>
-              <a:t>05/04/2019</a:t>
+              <a:t>07/04/2019</a:t>
             </a:fld>
             <a:endParaRPr lang="en-IE"/>
           </a:p>
@@ -4794,7 +4795,7 @@
           <a:p>
             <a:fld id="{6332FE72-1E95-463A-95D4-9DD1E29E749E}" type="datetimeFigureOut">
               <a:rPr lang="en-IE" smtClean="0"/>
-              <a:t>05/04/2019</a:t>
+              <a:t>07/04/2019</a:t>
             </a:fld>
             <a:endParaRPr lang="en-IE"/>
           </a:p>
@@ -5085,7 +5086,7 @@
           <a:p>
             <a:fld id="{6332FE72-1E95-463A-95D4-9DD1E29E749E}" type="datetimeFigureOut">
               <a:rPr lang="en-IE" smtClean="0"/>
-              <a:t>05/04/2019</a:t>
+              <a:t>07/04/2019</a:t>
             </a:fld>
             <a:endParaRPr lang="en-IE"/>
           </a:p>
@@ -5615,7 +5616,7 @@
           <a:p>
             <a:fld id="{6332FE72-1E95-463A-95D4-9DD1E29E749E}" type="datetimeFigureOut">
               <a:rPr lang="en-IE" smtClean="0"/>
-              <a:t>05/04/2019</a:t>
+              <a:t>07/04/2019</a:t>
             </a:fld>
             <a:endParaRPr lang="en-IE"/>
           </a:p>
@@ -6148,34 +6149,6 @@
       </p:grpSpPr>
       <p:sp>
         <p:nvSpPr>
-          <p:cNvPr id="2" name="Title 1">
-            <a:extLst>
-              <a:ext uri="{FF2B5EF4-FFF2-40B4-BE49-F238E27FC236}">
-                <a16:creationId xmlns:a16="http://schemas.microsoft.com/office/drawing/2014/main" id="{CD21715A-8A88-4ADF-AB25-49BDC47441B0}"/>
-              </a:ext>
-            </a:extLst>
-          </p:cNvPr>
-          <p:cNvSpPr>
-            <a:spLocks noGrp="1"/>
-          </p:cNvSpPr>
-          <p:nvPr>
-            <p:ph type="ctrTitle"/>
-          </p:nvPr>
-        </p:nvSpPr>
-        <p:spPr/>
-        <p:txBody>
-          <a:bodyPr/>
-          <a:lstStyle/>
-          <a:p>
-            <a:r>
-              <a:rPr lang="en-IE" dirty="0"/>
-              <a:t>Gesture Based UI Project</a:t>
-            </a:r>
-          </a:p>
-        </p:txBody>
-      </p:sp>
-      <p:sp>
-        <p:nvSpPr>
           <p:cNvPr id="3" name="Subtitle 2">
             <a:extLst>
               <a:ext uri="{FF2B5EF4-FFF2-40B4-BE49-F238E27FC236}">
@@ -6202,6 +6175,42 @@
           </a:p>
         </p:txBody>
       </p:sp>
+      <p:pic>
+        <p:nvPicPr>
+          <p:cNvPr id="5" name="Picture 4">
+            <a:extLst>
+              <a:ext uri="{FF2B5EF4-FFF2-40B4-BE49-F238E27FC236}">
+                <a16:creationId xmlns:a16="http://schemas.microsoft.com/office/drawing/2014/main" id="{F2A9547B-10E2-4A27-89FD-5F6FB364EAD8}"/>
+              </a:ext>
+            </a:extLst>
+          </p:cNvPr>
+          <p:cNvPicPr>
+            <a:picLocks noChangeAspect="1"/>
+          </p:cNvPicPr>
+          <p:nvPr/>
+        </p:nvPicPr>
+        <p:blipFill>
+          <a:blip r:embed="rId2">
+            <a:extLst>
+              <a:ext uri="{28A0092B-C50C-407E-A947-70E740481C1C}">
+                <a14:useLocalDpi xmlns:a14="http://schemas.microsoft.com/office/drawing/2010/main" val="0"/>
+              </a:ext>
+            </a:extLst>
+          </a:blip>
+          <a:stretch>
+            <a:fillRect/>
+          </a:stretch>
+        </p:blipFill>
+        <p:spPr>
+          <a:xfrm>
+            <a:off x="4871732" y="1899828"/>
+            <a:ext cx="5314286" cy="1923810"/>
+          </a:xfrm>
+          <a:prstGeom prst="rect">
+            <a:avLst/>
+          </a:prstGeom>
+        </p:spPr>
+      </p:pic>
     </p:spTree>
     <p:extLst>
       <p:ext uri="{BB962C8B-B14F-4D97-AF65-F5344CB8AC3E}">
@@ -6248,7 +6257,12 @@
             <p:ph type="title"/>
           </p:nvPr>
         </p:nvSpPr>
-        <p:spPr/>
+        <p:spPr>
+          <a:xfrm>
+            <a:off x="1400421" y="2552700"/>
+            <a:ext cx="10018713" cy="1752599"/>
+          </a:xfrm>
+        </p:spPr>
         <p:txBody>
           <a:bodyPr/>
           <a:lstStyle/>
@@ -6257,31 +6271,6 @@
               <a:rPr lang="en-IE" dirty="0"/>
               <a:t>Demonstration </a:t>
             </a:r>
-          </a:p>
-        </p:txBody>
-      </p:sp>
-      <p:sp>
-        <p:nvSpPr>
-          <p:cNvPr id="3" name="Content Placeholder 2">
-            <a:extLst>
-              <a:ext uri="{FF2B5EF4-FFF2-40B4-BE49-F238E27FC236}">
-                <a16:creationId xmlns:a16="http://schemas.microsoft.com/office/drawing/2014/main" id="{229C5BB0-D3BA-45CD-A3D1-060D01E375E4}"/>
-              </a:ext>
-            </a:extLst>
-          </p:cNvPr>
-          <p:cNvSpPr>
-            <a:spLocks noGrp="1"/>
-          </p:cNvSpPr>
-          <p:nvPr>
-            <p:ph idx="1"/>
-          </p:nvPr>
-        </p:nvSpPr>
-        <p:spPr/>
-        <p:txBody>
-          <a:bodyPr/>
-          <a:lstStyle/>
-          <a:p>
-            <a:endParaRPr lang="en-IE"/>
           </a:p>
         </p:txBody>
       </p:sp>
@@ -6289,6 +6278,69 @@
     <p:extLst>
       <p:ext uri="{BB962C8B-B14F-4D97-AF65-F5344CB8AC3E}">
         <p14:creationId xmlns:p14="http://schemas.microsoft.com/office/powerpoint/2010/main" val="4289040422"/>
+      </p:ext>
+    </p:extLst>
+  </p:cSld>
+  <p:clrMapOvr>
+    <a:masterClrMapping/>
+  </p:clrMapOvr>
+</p:sld>
+</file>
+
+<file path=ppt/slides/slide11.xml><?xml version="1.0" encoding="utf-8"?>
+<p:sld xmlns:a="http://schemas.openxmlformats.org/drawingml/2006/main" xmlns:r="http://schemas.openxmlformats.org/officeDocument/2006/relationships" xmlns:p="http://schemas.openxmlformats.org/presentationml/2006/main">
+  <p:cSld>
+    <p:spTree>
+      <p:nvGrpSpPr>
+        <p:cNvPr id="1" name=""/>
+        <p:cNvGrpSpPr/>
+        <p:nvPr/>
+      </p:nvGrpSpPr>
+      <p:grpSpPr>
+        <a:xfrm>
+          <a:off x="0" y="0"/>
+          <a:ext cx="0" cy="0"/>
+          <a:chOff x="0" y="0"/>
+          <a:chExt cx="0" cy="0"/>
+        </a:xfrm>
+      </p:grpSpPr>
+      <p:sp>
+        <p:nvSpPr>
+          <p:cNvPr id="2" name="Title 1">
+            <a:extLst>
+              <a:ext uri="{FF2B5EF4-FFF2-40B4-BE49-F238E27FC236}">
+                <a16:creationId xmlns:a16="http://schemas.microsoft.com/office/drawing/2014/main" id="{D8634F58-B35D-44F0-898C-F71FF35A87E9}"/>
+              </a:ext>
+            </a:extLst>
+          </p:cNvPr>
+          <p:cNvSpPr>
+            <a:spLocks noGrp="1"/>
+          </p:cNvSpPr>
+          <p:nvPr>
+            <p:ph type="title"/>
+          </p:nvPr>
+        </p:nvSpPr>
+        <p:spPr>
+          <a:xfrm>
+            <a:off x="1484309" y="2552700"/>
+            <a:ext cx="10018713" cy="1752599"/>
+          </a:xfrm>
+        </p:spPr>
+        <p:txBody>
+          <a:bodyPr/>
+          <a:lstStyle/>
+          <a:p>
+            <a:r>
+              <a:rPr lang="en-IE" dirty="0"/>
+              <a:t>Any Questions?</a:t>
+            </a:r>
+          </a:p>
+        </p:txBody>
+      </p:sp>
+    </p:spTree>
+    <p:extLst>
+      <p:ext uri="{BB962C8B-B14F-4D97-AF65-F5344CB8AC3E}">
+        <p14:creationId xmlns:p14="http://schemas.microsoft.com/office/powerpoint/2010/main" val="1464259436"/>
       </p:ext>
     </p:extLst>
   </p:cSld>
@@ -6344,51 +6396,10 @@
           <a:lstStyle/>
           <a:p>
             <a:r>
-              <a:rPr lang="en-IE" sz="6000" dirty="0" err="1">
-                <a:latin typeface="Chinese Rocks Rg" panose="00000400000000000000" pitchFamily="2" charset="0"/>
-              </a:rPr>
-              <a:t>Rootin</a:t>
-            </a:r>
-            <a:r>
               <a:rPr lang="en-IE" sz="6000" dirty="0">
                 <a:latin typeface="Chinese Rocks Rg" panose="00000400000000000000" pitchFamily="2" charset="0"/>
               </a:rPr>
-              <a:t>’ </a:t>
-            </a:r>
-            <a:r>
-              <a:rPr lang="en-IE" sz="6000" dirty="0" err="1">
-                <a:latin typeface="Chinese Rocks Rg" panose="00000400000000000000" pitchFamily="2" charset="0"/>
-              </a:rPr>
-              <a:t>Tootin</a:t>
-            </a:r>
-            <a:r>
-              <a:rPr lang="en-IE" sz="6000" dirty="0">
-                <a:latin typeface="Chinese Rocks Rg" panose="00000400000000000000" pitchFamily="2" charset="0"/>
-              </a:rPr>
-              <a:t>’</a:t>
-            </a:r>
-            <a:br>
-              <a:rPr lang="en-IE" sz="6000" dirty="0">
-                <a:latin typeface="Chinese Rocks Rg" panose="00000400000000000000" pitchFamily="2" charset="0"/>
-              </a:rPr>
-            </a:br>
-            <a:r>
-              <a:rPr lang="en-IE" sz="6000" dirty="0">
-                <a:latin typeface="Chinese Rocks Rg" panose="00000400000000000000" pitchFamily="2" charset="0"/>
-              </a:rPr>
-              <a:t>Cowboy </a:t>
-            </a:r>
-            <a:r>
-              <a:rPr lang="en-IE" sz="6000" dirty="0" err="1">
-                <a:latin typeface="Chinese Rocks Rg" panose="00000400000000000000" pitchFamily="2" charset="0"/>
-              </a:rPr>
-              <a:t>Shootin</a:t>
-            </a:r>
-            <a:r>
-              <a:rPr lang="en-IE" sz="6000" dirty="0">
-                <a:latin typeface="Chinese Rocks Rg" panose="00000400000000000000" pitchFamily="2" charset="0"/>
-              </a:rPr>
-              <a:t>’</a:t>
+              <a:t>The Game</a:t>
             </a:r>
           </a:p>
         </p:txBody>
@@ -6760,15 +6771,17 @@
             </a:r>
             <a:r>
               <a:rPr lang="en-IE" dirty="0"/>
-              <a:t> when it was working and the band </a:t>
-            </a:r>
-            <a:r>
-              <a:rPr lang="en-IE"/>
-              <a:t>was available</a:t>
-            </a:r>
-          </a:p>
-          <a:p>
-            <a:endParaRPr lang="en-IE"/>
+              <a:t> when it was working and the band was available</a:t>
+            </a:r>
+          </a:p>
+          <a:p>
+            <a:r>
+              <a:rPr lang="en-IE" dirty="0"/>
+              <a:t>Plan to add sound effects, more levels, and a scoring system</a:t>
+            </a:r>
+          </a:p>
+          <a:p>
+            <a:endParaRPr lang="en-IE" dirty="0"/>
           </a:p>
         </p:txBody>
       </p:sp>

</xml_diff>